<commit_message>
commit!! Until this commit, no log was written on purpose
from now on, each feature will be logged separetely. promise!
</commit_message>
<xml_diff>
--- a/Data/icon.pptx
+++ b/Data/icon.pptx
@@ -6,6 +6,8 @@
   </p:sldMasterIdLst>
   <p:sldIdLst>
     <p:sldId id="256" r:id="rId2"/>
+    <p:sldId id="257" r:id="rId3"/>
+    <p:sldId id="258" r:id="rId4"/>
   </p:sldIdLst>
   <p:sldSz cx="9144000" cy="6858000" type="screen4x3"/>
   <p:notesSz cx="6858000" cy="9144000"/>
@@ -289,7 +291,7 @@
             <a:fld id="{FD9DC59D-A2C8-4265-9019-93023220A962}" type="datetimeFigureOut">
               <a:rPr lang="ko-KR" altLang="en-US" smtClean="0"/>
               <a:pPr/>
-              <a:t>2016-07-06</a:t>
+              <a:t>2016-07-08</a:t>
             </a:fld>
             <a:endParaRPr lang="ko-KR" altLang="en-US"/>
           </a:p>
@@ -456,7 +458,7 @@
             <a:fld id="{FD9DC59D-A2C8-4265-9019-93023220A962}" type="datetimeFigureOut">
               <a:rPr lang="ko-KR" altLang="en-US" smtClean="0"/>
               <a:pPr/>
-              <a:t>2016-07-06</a:t>
+              <a:t>2016-07-08</a:t>
             </a:fld>
             <a:endParaRPr lang="ko-KR" altLang="en-US"/>
           </a:p>
@@ -633,7 +635,7 @@
             <a:fld id="{FD9DC59D-A2C8-4265-9019-93023220A962}" type="datetimeFigureOut">
               <a:rPr lang="ko-KR" altLang="en-US" smtClean="0"/>
               <a:pPr/>
-              <a:t>2016-07-06</a:t>
+              <a:t>2016-07-08</a:t>
             </a:fld>
             <a:endParaRPr lang="ko-KR" altLang="en-US"/>
           </a:p>
@@ -800,7 +802,7 @@
             <a:fld id="{FD9DC59D-A2C8-4265-9019-93023220A962}" type="datetimeFigureOut">
               <a:rPr lang="ko-KR" altLang="en-US" smtClean="0"/>
               <a:pPr/>
-              <a:t>2016-07-06</a:t>
+              <a:t>2016-07-08</a:t>
             </a:fld>
             <a:endParaRPr lang="ko-KR" altLang="en-US"/>
           </a:p>
@@ -1043,7 +1045,7 @@
             <a:fld id="{FD9DC59D-A2C8-4265-9019-93023220A962}" type="datetimeFigureOut">
               <a:rPr lang="ko-KR" altLang="en-US" smtClean="0"/>
               <a:pPr/>
-              <a:t>2016-07-06</a:t>
+              <a:t>2016-07-08</a:t>
             </a:fld>
             <a:endParaRPr lang="ko-KR" altLang="en-US"/>
           </a:p>
@@ -1328,7 +1330,7 @@
             <a:fld id="{FD9DC59D-A2C8-4265-9019-93023220A962}" type="datetimeFigureOut">
               <a:rPr lang="ko-KR" altLang="en-US" smtClean="0"/>
               <a:pPr/>
-              <a:t>2016-07-06</a:t>
+              <a:t>2016-07-08</a:t>
             </a:fld>
             <a:endParaRPr lang="ko-KR" altLang="en-US"/>
           </a:p>
@@ -1747,7 +1749,7 @@
             <a:fld id="{FD9DC59D-A2C8-4265-9019-93023220A962}" type="datetimeFigureOut">
               <a:rPr lang="ko-KR" altLang="en-US" smtClean="0"/>
               <a:pPr/>
-              <a:t>2016-07-06</a:t>
+              <a:t>2016-07-08</a:t>
             </a:fld>
             <a:endParaRPr lang="ko-KR" altLang="en-US"/>
           </a:p>
@@ -1862,7 +1864,7 @@
             <a:fld id="{FD9DC59D-A2C8-4265-9019-93023220A962}" type="datetimeFigureOut">
               <a:rPr lang="ko-KR" altLang="en-US" smtClean="0"/>
               <a:pPr/>
-              <a:t>2016-07-06</a:t>
+              <a:t>2016-07-08</a:t>
             </a:fld>
             <a:endParaRPr lang="ko-KR" altLang="en-US"/>
           </a:p>
@@ -1954,7 +1956,7 @@
             <a:fld id="{FD9DC59D-A2C8-4265-9019-93023220A962}" type="datetimeFigureOut">
               <a:rPr lang="ko-KR" altLang="en-US" smtClean="0"/>
               <a:pPr/>
-              <a:t>2016-07-06</a:t>
+              <a:t>2016-07-08</a:t>
             </a:fld>
             <a:endParaRPr lang="ko-KR" altLang="en-US"/>
           </a:p>
@@ -2228,7 +2230,7 @@
             <a:fld id="{FD9DC59D-A2C8-4265-9019-93023220A962}" type="datetimeFigureOut">
               <a:rPr lang="ko-KR" altLang="en-US" smtClean="0"/>
               <a:pPr/>
-              <a:t>2016-07-06</a:t>
+              <a:t>2016-07-08</a:t>
             </a:fld>
             <a:endParaRPr lang="ko-KR" altLang="en-US"/>
           </a:p>
@@ -2478,7 +2480,7 @@
             <a:fld id="{FD9DC59D-A2C8-4265-9019-93023220A962}" type="datetimeFigureOut">
               <a:rPr lang="ko-KR" altLang="en-US" smtClean="0"/>
               <a:pPr/>
-              <a:t>2016-07-06</a:t>
+              <a:t>2016-07-08</a:t>
             </a:fld>
             <a:endParaRPr lang="ko-KR" altLang="en-US"/>
           </a:p>
@@ -2688,7 +2690,7 @@
             <a:fld id="{FD9DC59D-A2C8-4265-9019-93023220A962}" type="datetimeFigureOut">
               <a:rPr lang="ko-KR" altLang="en-US" smtClean="0"/>
               <a:pPr/>
-              <a:t>2016-07-06</a:t>
+              <a:t>2016-07-08</a:t>
             </a:fld>
             <a:endParaRPr lang="ko-KR" altLang="en-US"/>
           </a:p>
@@ -4480,6 +4482,2913 @@
 </p:sld>
 </file>
 
+<file path=ppt/slides/slide2.xml><?xml version="1.0" encoding="utf-8"?>
+<p:sld xmlns:a="http://schemas.openxmlformats.org/drawingml/2006/main" xmlns:r="http://schemas.openxmlformats.org/officeDocument/2006/relationships" xmlns:p="http://schemas.openxmlformats.org/presentationml/2006/main">
+  <p:cSld>
+    <p:spTree>
+      <p:nvGrpSpPr>
+        <p:cNvPr id="1" name=""/>
+        <p:cNvGrpSpPr/>
+        <p:nvPr/>
+      </p:nvGrpSpPr>
+      <p:grpSpPr>
+        <a:xfrm>
+          <a:off x="0" y="0"/>
+          <a:ext cx="0" cy="0"/>
+          <a:chOff x="0" y="0"/>
+          <a:chExt cx="0" cy="0"/>
+        </a:xfrm>
+      </p:grpSpPr>
+      <p:grpSp>
+        <p:nvGrpSpPr>
+          <p:cNvPr id="2" name="그룹 7"/>
+          <p:cNvGrpSpPr/>
+          <p:nvPr/>
+        </p:nvGrpSpPr>
+        <p:grpSpPr>
+          <a:xfrm>
+            <a:off x="4211960" y="1628800"/>
+            <a:ext cx="1512168" cy="1512168"/>
+            <a:chOff x="1835696" y="1556792"/>
+            <a:chExt cx="2088232" cy="2088232"/>
+          </a:xfrm>
+          <a:effectLst>
+            <a:outerShdw blurRad="50800" dist="50800" dir="5400000" algn="ctr" rotWithShape="0">
+              <a:srgbClr val="000000">
+                <a:alpha val="0"/>
+              </a:srgbClr>
+            </a:outerShdw>
+          </a:effectLst>
+        </p:grpSpPr>
+        <p:sp>
+          <p:nvSpPr>
+            <p:cNvPr id="4" name="타원 3"/>
+            <p:cNvSpPr/>
+            <p:nvPr/>
+          </p:nvSpPr>
+          <p:spPr>
+            <a:xfrm>
+              <a:off x="1835696" y="1556792"/>
+              <a:ext cx="2088232" cy="2088232"/>
+            </a:xfrm>
+            <a:prstGeom prst="ellipse">
+              <a:avLst/>
+            </a:prstGeom>
+            <a:solidFill>
+              <a:schemeClr val="accent3">
+                <a:lumMod val="60000"/>
+                <a:lumOff val="40000"/>
+              </a:schemeClr>
+            </a:solidFill>
+            <a:ln>
+              <a:noFill/>
+            </a:ln>
+          </p:spPr>
+          <p:style>
+            <a:lnRef idx="2">
+              <a:schemeClr val="accent1">
+                <a:shade val="50000"/>
+              </a:schemeClr>
+            </a:lnRef>
+            <a:fillRef idx="1">
+              <a:schemeClr val="accent1"/>
+            </a:fillRef>
+            <a:effectRef idx="0">
+              <a:schemeClr val="accent1"/>
+            </a:effectRef>
+            <a:fontRef idx="minor">
+              <a:schemeClr val="lt1"/>
+            </a:fontRef>
+          </p:style>
+          <p:txBody>
+            <a:bodyPr rtlCol="0" anchor="ctr"/>
+            <a:lstStyle/>
+            <a:p>
+              <a:pPr algn="ctr"/>
+              <a:endParaRPr lang="ko-KR" altLang="en-US"/>
+            </a:p>
+          </p:txBody>
+        </p:sp>
+        <p:sp>
+          <p:nvSpPr>
+            <p:cNvPr id="5" name="타원 4"/>
+            <p:cNvSpPr/>
+            <p:nvPr/>
+          </p:nvSpPr>
+          <p:spPr>
+            <a:xfrm>
+              <a:off x="1979712" y="1700808"/>
+              <a:ext cx="1800200" cy="1800200"/>
+            </a:xfrm>
+            <a:prstGeom prst="ellipse">
+              <a:avLst/>
+            </a:prstGeom>
+            <a:solidFill>
+              <a:schemeClr val="accent3">
+                <a:lumMod val="60000"/>
+                <a:lumOff val="40000"/>
+              </a:schemeClr>
+            </a:solidFill>
+            <a:ln>
+              <a:noFill/>
+            </a:ln>
+          </p:spPr>
+          <p:style>
+            <a:lnRef idx="2">
+              <a:schemeClr val="accent1">
+                <a:shade val="50000"/>
+              </a:schemeClr>
+            </a:lnRef>
+            <a:fillRef idx="1">
+              <a:schemeClr val="accent1"/>
+            </a:fillRef>
+            <a:effectRef idx="0">
+              <a:schemeClr val="accent1"/>
+            </a:effectRef>
+            <a:fontRef idx="minor">
+              <a:schemeClr val="lt1"/>
+            </a:fontRef>
+          </p:style>
+          <p:txBody>
+            <a:bodyPr rtlCol="0" anchor="ctr"/>
+            <a:lstStyle/>
+            <a:p>
+              <a:pPr algn="ctr"/>
+              <a:endParaRPr lang="ko-KR" altLang="en-US"/>
+            </a:p>
+          </p:txBody>
+        </p:sp>
+        <p:sp>
+          <p:nvSpPr>
+            <p:cNvPr id="6" name="갈매기형 수장 5"/>
+            <p:cNvSpPr/>
+            <p:nvPr/>
+          </p:nvSpPr>
+          <p:spPr>
+            <a:xfrm>
+              <a:off x="2483768" y="2005205"/>
+              <a:ext cx="936104" cy="1191406"/>
+            </a:xfrm>
+            <a:prstGeom prst="chevron">
+              <a:avLst>
+                <a:gd name="adj" fmla="val 55328"/>
+              </a:avLst>
+            </a:prstGeom>
+            <a:solidFill>
+              <a:schemeClr val="accent3">
+                <a:lumMod val="75000"/>
+              </a:schemeClr>
+            </a:solidFill>
+            <a:ln>
+              <a:noFill/>
+            </a:ln>
+          </p:spPr>
+          <p:style>
+            <a:lnRef idx="2">
+              <a:schemeClr val="accent1">
+                <a:shade val="50000"/>
+              </a:schemeClr>
+            </a:lnRef>
+            <a:fillRef idx="1">
+              <a:schemeClr val="accent1"/>
+            </a:fillRef>
+            <a:effectRef idx="0">
+              <a:schemeClr val="accent1"/>
+            </a:effectRef>
+            <a:fontRef idx="minor">
+              <a:schemeClr val="lt1"/>
+            </a:fontRef>
+          </p:style>
+          <p:txBody>
+            <a:bodyPr rtlCol="0" anchor="ctr"/>
+            <a:lstStyle/>
+            <a:p>
+              <a:pPr algn="ctr"/>
+              <a:endParaRPr lang="ko-KR" altLang="en-US">
+                <a:solidFill>
+                  <a:schemeClr val="tx1"/>
+                </a:solidFill>
+              </a:endParaRPr>
+            </a:p>
+          </p:txBody>
+        </p:sp>
+      </p:grpSp>
+      <p:grpSp>
+        <p:nvGrpSpPr>
+          <p:cNvPr id="3" name="그룹 12"/>
+          <p:cNvGrpSpPr/>
+          <p:nvPr/>
+        </p:nvGrpSpPr>
+        <p:grpSpPr>
+          <a:xfrm>
+            <a:off x="6084168" y="1628800"/>
+            <a:ext cx="1512168" cy="1512168"/>
+            <a:chOff x="1835696" y="1556792"/>
+            <a:chExt cx="2088232" cy="2088232"/>
+          </a:xfrm>
+        </p:grpSpPr>
+        <p:sp>
+          <p:nvSpPr>
+            <p:cNvPr id="14" name="타원 13"/>
+            <p:cNvSpPr/>
+            <p:nvPr/>
+          </p:nvSpPr>
+          <p:spPr>
+            <a:xfrm>
+              <a:off x="1835696" y="1556792"/>
+              <a:ext cx="2088232" cy="2088232"/>
+            </a:xfrm>
+            <a:prstGeom prst="ellipse">
+              <a:avLst/>
+            </a:prstGeom>
+            <a:solidFill>
+              <a:schemeClr val="accent3">
+                <a:lumMod val="60000"/>
+                <a:lumOff val="40000"/>
+              </a:schemeClr>
+            </a:solidFill>
+            <a:ln>
+              <a:noFill/>
+            </a:ln>
+          </p:spPr>
+          <p:style>
+            <a:lnRef idx="2">
+              <a:schemeClr val="accent1">
+                <a:shade val="50000"/>
+              </a:schemeClr>
+            </a:lnRef>
+            <a:fillRef idx="1">
+              <a:schemeClr val="accent1"/>
+            </a:fillRef>
+            <a:effectRef idx="0">
+              <a:schemeClr val="accent1"/>
+            </a:effectRef>
+            <a:fontRef idx="minor">
+              <a:schemeClr val="lt1"/>
+            </a:fontRef>
+          </p:style>
+          <p:txBody>
+            <a:bodyPr rtlCol="0" anchor="ctr"/>
+            <a:lstStyle/>
+            <a:p>
+              <a:pPr algn="ctr"/>
+              <a:endParaRPr lang="ko-KR" altLang="en-US"/>
+            </a:p>
+          </p:txBody>
+        </p:sp>
+        <p:sp>
+          <p:nvSpPr>
+            <p:cNvPr id="15" name="타원 14"/>
+            <p:cNvSpPr/>
+            <p:nvPr/>
+          </p:nvSpPr>
+          <p:spPr>
+            <a:xfrm>
+              <a:off x="1979712" y="1700808"/>
+              <a:ext cx="1800200" cy="1800200"/>
+            </a:xfrm>
+            <a:prstGeom prst="ellipse">
+              <a:avLst/>
+            </a:prstGeom>
+            <a:solidFill>
+              <a:schemeClr val="accent3">
+                <a:lumMod val="60000"/>
+                <a:lumOff val="40000"/>
+              </a:schemeClr>
+            </a:solidFill>
+            <a:ln>
+              <a:noFill/>
+            </a:ln>
+          </p:spPr>
+          <p:style>
+            <a:lnRef idx="2">
+              <a:schemeClr val="accent1">
+                <a:shade val="50000"/>
+              </a:schemeClr>
+            </a:lnRef>
+            <a:fillRef idx="1">
+              <a:schemeClr val="accent1"/>
+            </a:fillRef>
+            <a:effectRef idx="0">
+              <a:schemeClr val="accent1"/>
+            </a:effectRef>
+            <a:fontRef idx="minor">
+              <a:schemeClr val="lt1"/>
+            </a:fontRef>
+          </p:style>
+          <p:txBody>
+            <a:bodyPr rtlCol="0" anchor="ctr"/>
+            <a:lstStyle/>
+            <a:p>
+              <a:pPr algn="ctr"/>
+              <a:endParaRPr lang="ko-KR" altLang="en-US"/>
+            </a:p>
+          </p:txBody>
+        </p:sp>
+        <p:sp>
+          <p:nvSpPr>
+            <p:cNvPr id="16" name="갈매기형 수장 15"/>
+            <p:cNvSpPr/>
+            <p:nvPr/>
+          </p:nvSpPr>
+          <p:spPr>
+            <a:xfrm>
+              <a:off x="2396701" y="2005205"/>
+              <a:ext cx="623279" cy="1191407"/>
+            </a:xfrm>
+            <a:prstGeom prst="chevron">
+              <a:avLst>
+                <a:gd name="adj" fmla="val 55328"/>
+              </a:avLst>
+            </a:prstGeom>
+            <a:solidFill>
+              <a:schemeClr val="accent3">
+                <a:lumMod val="75000"/>
+              </a:schemeClr>
+            </a:solidFill>
+            <a:ln>
+              <a:noFill/>
+            </a:ln>
+          </p:spPr>
+          <p:style>
+            <a:lnRef idx="2">
+              <a:schemeClr val="accent1">
+                <a:shade val="50000"/>
+              </a:schemeClr>
+            </a:lnRef>
+            <a:fillRef idx="1">
+              <a:schemeClr val="accent1"/>
+            </a:fillRef>
+            <a:effectRef idx="0">
+              <a:schemeClr val="accent1"/>
+            </a:effectRef>
+            <a:fontRef idx="minor">
+              <a:schemeClr val="lt1"/>
+            </a:fontRef>
+          </p:style>
+          <p:txBody>
+            <a:bodyPr rtlCol="0" anchor="ctr"/>
+            <a:lstStyle/>
+            <a:p>
+              <a:pPr algn="ctr"/>
+              <a:endParaRPr lang="ko-KR" altLang="en-US">
+                <a:solidFill>
+                  <a:schemeClr val="tx1"/>
+                </a:solidFill>
+              </a:endParaRPr>
+            </a:p>
+          </p:txBody>
+        </p:sp>
+        <p:sp>
+          <p:nvSpPr>
+            <p:cNvPr id="17" name="갈매기형 수장 16"/>
+            <p:cNvSpPr/>
+            <p:nvPr/>
+          </p:nvSpPr>
+          <p:spPr>
+            <a:xfrm>
+              <a:off x="2918759" y="2005205"/>
+              <a:ext cx="623279" cy="1191407"/>
+            </a:xfrm>
+            <a:prstGeom prst="chevron">
+              <a:avLst>
+                <a:gd name="adj" fmla="val 55328"/>
+              </a:avLst>
+            </a:prstGeom>
+            <a:solidFill>
+              <a:schemeClr val="accent3">
+                <a:lumMod val="75000"/>
+              </a:schemeClr>
+            </a:solidFill>
+            <a:ln>
+              <a:noFill/>
+            </a:ln>
+          </p:spPr>
+          <p:style>
+            <a:lnRef idx="2">
+              <a:schemeClr val="accent1">
+                <a:shade val="50000"/>
+              </a:schemeClr>
+            </a:lnRef>
+            <a:fillRef idx="1">
+              <a:schemeClr val="accent1"/>
+            </a:fillRef>
+            <a:effectRef idx="0">
+              <a:schemeClr val="accent1"/>
+            </a:effectRef>
+            <a:fontRef idx="minor">
+              <a:schemeClr val="lt1"/>
+            </a:fontRef>
+          </p:style>
+          <p:txBody>
+            <a:bodyPr rtlCol="0" anchor="ctr"/>
+            <a:lstStyle/>
+            <a:p>
+              <a:pPr algn="ctr"/>
+              <a:endParaRPr lang="ko-KR" altLang="en-US">
+                <a:solidFill>
+                  <a:schemeClr val="tx1"/>
+                </a:solidFill>
+              </a:endParaRPr>
+            </a:p>
+          </p:txBody>
+        </p:sp>
+      </p:grpSp>
+      <p:grpSp>
+        <p:nvGrpSpPr>
+          <p:cNvPr id="7" name="그룹 17"/>
+          <p:cNvGrpSpPr/>
+          <p:nvPr/>
+        </p:nvGrpSpPr>
+        <p:grpSpPr>
+          <a:xfrm rot="10800000">
+            <a:off x="323528" y="1628800"/>
+            <a:ext cx="1512168" cy="1512168"/>
+            <a:chOff x="1835696" y="1556792"/>
+            <a:chExt cx="2088232" cy="2088232"/>
+          </a:xfrm>
+        </p:grpSpPr>
+        <p:sp>
+          <p:nvSpPr>
+            <p:cNvPr id="19" name="타원 18"/>
+            <p:cNvSpPr/>
+            <p:nvPr/>
+          </p:nvSpPr>
+          <p:spPr>
+            <a:xfrm>
+              <a:off x="1835696" y="1556792"/>
+              <a:ext cx="2088232" cy="2088232"/>
+            </a:xfrm>
+            <a:prstGeom prst="ellipse">
+              <a:avLst/>
+            </a:prstGeom>
+            <a:solidFill>
+              <a:schemeClr val="accent3">
+                <a:lumMod val="60000"/>
+                <a:lumOff val="40000"/>
+              </a:schemeClr>
+            </a:solidFill>
+            <a:ln>
+              <a:noFill/>
+            </a:ln>
+          </p:spPr>
+          <p:style>
+            <a:lnRef idx="2">
+              <a:schemeClr val="accent1">
+                <a:shade val="50000"/>
+              </a:schemeClr>
+            </a:lnRef>
+            <a:fillRef idx="1">
+              <a:schemeClr val="accent1"/>
+            </a:fillRef>
+            <a:effectRef idx="0">
+              <a:schemeClr val="accent1"/>
+            </a:effectRef>
+            <a:fontRef idx="minor">
+              <a:schemeClr val="lt1"/>
+            </a:fontRef>
+          </p:style>
+          <p:txBody>
+            <a:bodyPr rtlCol="0" anchor="ctr"/>
+            <a:lstStyle/>
+            <a:p>
+              <a:pPr algn="ctr"/>
+              <a:endParaRPr lang="ko-KR" altLang="en-US"/>
+            </a:p>
+          </p:txBody>
+        </p:sp>
+        <p:sp>
+          <p:nvSpPr>
+            <p:cNvPr id="20" name="타원 19"/>
+            <p:cNvSpPr/>
+            <p:nvPr/>
+          </p:nvSpPr>
+          <p:spPr>
+            <a:xfrm>
+              <a:off x="1979712" y="1700808"/>
+              <a:ext cx="1800200" cy="1800200"/>
+            </a:xfrm>
+            <a:prstGeom prst="ellipse">
+              <a:avLst/>
+            </a:prstGeom>
+            <a:solidFill>
+              <a:schemeClr val="accent3">
+                <a:lumMod val="60000"/>
+                <a:lumOff val="40000"/>
+              </a:schemeClr>
+            </a:solidFill>
+            <a:ln>
+              <a:noFill/>
+            </a:ln>
+          </p:spPr>
+          <p:style>
+            <a:lnRef idx="2">
+              <a:schemeClr val="accent1">
+                <a:shade val="50000"/>
+              </a:schemeClr>
+            </a:lnRef>
+            <a:fillRef idx="1">
+              <a:schemeClr val="accent1"/>
+            </a:fillRef>
+            <a:effectRef idx="0">
+              <a:schemeClr val="accent1"/>
+            </a:effectRef>
+            <a:fontRef idx="minor">
+              <a:schemeClr val="lt1"/>
+            </a:fontRef>
+          </p:style>
+          <p:txBody>
+            <a:bodyPr rtlCol="0" anchor="ctr"/>
+            <a:lstStyle/>
+            <a:p>
+              <a:pPr algn="ctr"/>
+              <a:endParaRPr lang="ko-KR" altLang="en-US"/>
+            </a:p>
+          </p:txBody>
+        </p:sp>
+        <p:sp>
+          <p:nvSpPr>
+            <p:cNvPr id="21" name="갈매기형 수장 20"/>
+            <p:cNvSpPr/>
+            <p:nvPr/>
+          </p:nvSpPr>
+          <p:spPr>
+            <a:xfrm>
+              <a:off x="2396701" y="2005205"/>
+              <a:ext cx="623279" cy="1191407"/>
+            </a:xfrm>
+            <a:prstGeom prst="chevron">
+              <a:avLst>
+                <a:gd name="adj" fmla="val 55328"/>
+              </a:avLst>
+            </a:prstGeom>
+            <a:solidFill>
+              <a:schemeClr val="accent3">
+                <a:lumMod val="75000"/>
+              </a:schemeClr>
+            </a:solidFill>
+            <a:ln>
+              <a:noFill/>
+            </a:ln>
+          </p:spPr>
+          <p:style>
+            <a:lnRef idx="2">
+              <a:schemeClr val="accent1">
+                <a:shade val="50000"/>
+              </a:schemeClr>
+            </a:lnRef>
+            <a:fillRef idx="1">
+              <a:schemeClr val="accent1"/>
+            </a:fillRef>
+            <a:effectRef idx="0">
+              <a:schemeClr val="accent1"/>
+            </a:effectRef>
+            <a:fontRef idx="minor">
+              <a:schemeClr val="lt1"/>
+            </a:fontRef>
+          </p:style>
+          <p:txBody>
+            <a:bodyPr rtlCol="0" anchor="ctr"/>
+            <a:lstStyle/>
+            <a:p>
+              <a:pPr algn="ctr"/>
+              <a:endParaRPr lang="ko-KR" altLang="en-US">
+                <a:solidFill>
+                  <a:schemeClr val="tx1"/>
+                </a:solidFill>
+              </a:endParaRPr>
+            </a:p>
+          </p:txBody>
+        </p:sp>
+        <p:sp>
+          <p:nvSpPr>
+            <p:cNvPr id="22" name="갈매기형 수장 21"/>
+            <p:cNvSpPr/>
+            <p:nvPr/>
+          </p:nvSpPr>
+          <p:spPr>
+            <a:xfrm>
+              <a:off x="2918759" y="2005205"/>
+              <a:ext cx="623279" cy="1191407"/>
+            </a:xfrm>
+            <a:prstGeom prst="chevron">
+              <a:avLst>
+                <a:gd name="adj" fmla="val 55328"/>
+              </a:avLst>
+            </a:prstGeom>
+            <a:solidFill>
+              <a:schemeClr val="accent3">
+                <a:lumMod val="75000"/>
+              </a:schemeClr>
+            </a:solidFill>
+            <a:ln>
+              <a:noFill/>
+            </a:ln>
+          </p:spPr>
+          <p:style>
+            <a:lnRef idx="2">
+              <a:schemeClr val="accent1">
+                <a:shade val="50000"/>
+              </a:schemeClr>
+            </a:lnRef>
+            <a:fillRef idx="1">
+              <a:schemeClr val="accent1"/>
+            </a:fillRef>
+            <a:effectRef idx="0">
+              <a:schemeClr val="accent1"/>
+            </a:effectRef>
+            <a:fontRef idx="minor">
+              <a:schemeClr val="lt1"/>
+            </a:fontRef>
+          </p:style>
+          <p:txBody>
+            <a:bodyPr rtlCol="0" anchor="ctr"/>
+            <a:lstStyle/>
+            <a:p>
+              <a:pPr algn="ctr"/>
+              <a:endParaRPr lang="ko-KR" altLang="en-US">
+                <a:solidFill>
+                  <a:schemeClr val="tx1"/>
+                </a:solidFill>
+              </a:endParaRPr>
+            </a:p>
+          </p:txBody>
+        </p:sp>
+      </p:grpSp>
+      <p:grpSp>
+        <p:nvGrpSpPr>
+          <p:cNvPr id="8" name="그룹 22"/>
+          <p:cNvGrpSpPr/>
+          <p:nvPr/>
+        </p:nvGrpSpPr>
+        <p:grpSpPr>
+          <a:xfrm rot="10800000">
+            <a:off x="2195736" y="1628800"/>
+            <a:ext cx="1512168" cy="1512168"/>
+            <a:chOff x="1835696" y="1556792"/>
+            <a:chExt cx="2088232" cy="2088232"/>
+          </a:xfrm>
+        </p:grpSpPr>
+        <p:sp>
+          <p:nvSpPr>
+            <p:cNvPr id="24" name="타원 23"/>
+            <p:cNvSpPr/>
+            <p:nvPr/>
+          </p:nvSpPr>
+          <p:spPr>
+            <a:xfrm>
+              <a:off x="1835696" y="1556792"/>
+              <a:ext cx="2088232" cy="2088232"/>
+            </a:xfrm>
+            <a:prstGeom prst="ellipse">
+              <a:avLst/>
+            </a:prstGeom>
+            <a:solidFill>
+              <a:schemeClr val="accent3">
+                <a:lumMod val="60000"/>
+                <a:lumOff val="40000"/>
+              </a:schemeClr>
+            </a:solidFill>
+            <a:ln>
+              <a:noFill/>
+            </a:ln>
+          </p:spPr>
+          <p:style>
+            <a:lnRef idx="2">
+              <a:schemeClr val="accent1">
+                <a:shade val="50000"/>
+              </a:schemeClr>
+            </a:lnRef>
+            <a:fillRef idx="1">
+              <a:schemeClr val="accent1"/>
+            </a:fillRef>
+            <a:effectRef idx="0">
+              <a:schemeClr val="accent1"/>
+            </a:effectRef>
+            <a:fontRef idx="minor">
+              <a:schemeClr val="lt1"/>
+            </a:fontRef>
+          </p:style>
+          <p:txBody>
+            <a:bodyPr rtlCol="0" anchor="ctr"/>
+            <a:lstStyle/>
+            <a:p>
+              <a:pPr algn="ctr"/>
+              <a:endParaRPr lang="ko-KR" altLang="en-US"/>
+            </a:p>
+          </p:txBody>
+        </p:sp>
+        <p:sp>
+          <p:nvSpPr>
+            <p:cNvPr id="25" name="타원 24"/>
+            <p:cNvSpPr/>
+            <p:nvPr/>
+          </p:nvSpPr>
+          <p:spPr>
+            <a:xfrm>
+              <a:off x="1979712" y="1700808"/>
+              <a:ext cx="1800200" cy="1800200"/>
+            </a:xfrm>
+            <a:prstGeom prst="ellipse">
+              <a:avLst/>
+            </a:prstGeom>
+            <a:solidFill>
+              <a:schemeClr val="accent3">
+                <a:lumMod val="60000"/>
+                <a:lumOff val="40000"/>
+              </a:schemeClr>
+            </a:solidFill>
+            <a:ln>
+              <a:noFill/>
+            </a:ln>
+          </p:spPr>
+          <p:style>
+            <a:lnRef idx="2">
+              <a:schemeClr val="accent1">
+                <a:shade val="50000"/>
+              </a:schemeClr>
+            </a:lnRef>
+            <a:fillRef idx="1">
+              <a:schemeClr val="accent1"/>
+            </a:fillRef>
+            <a:effectRef idx="0">
+              <a:schemeClr val="accent1"/>
+            </a:effectRef>
+            <a:fontRef idx="minor">
+              <a:schemeClr val="lt1"/>
+            </a:fontRef>
+          </p:style>
+          <p:txBody>
+            <a:bodyPr rtlCol="0" anchor="ctr"/>
+            <a:lstStyle/>
+            <a:p>
+              <a:pPr algn="ctr"/>
+              <a:endParaRPr lang="ko-KR" altLang="en-US"/>
+            </a:p>
+          </p:txBody>
+        </p:sp>
+        <p:sp>
+          <p:nvSpPr>
+            <p:cNvPr id="26" name="갈매기형 수장 25"/>
+            <p:cNvSpPr/>
+            <p:nvPr/>
+          </p:nvSpPr>
+          <p:spPr>
+            <a:xfrm>
+              <a:off x="2483768" y="2005205"/>
+              <a:ext cx="936104" cy="1191406"/>
+            </a:xfrm>
+            <a:prstGeom prst="chevron">
+              <a:avLst>
+                <a:gd name="adj" fmla="val 55328"/>
+              </a:avLst>
+            </a:prstGeom>
+            <a:solidFill>
+              <a:schemeClr val="accent3">
+                <a:lumMod val="75000"/>
+              </a:schemeClr>
+            </a:solidFill>
+            <a:ln>
+              <a:noFill/>
+            </a:ln>
+          </p:spPr>
+          <p:style>
+            <a:lnRef idx="2">
+              <a:schemeClr val="accent1">
+                <a:shade val="50000"/>
+              </a:schemeClr>
+            </a:lnRef>
+            <a:fillRef idx="1">
+              <a:schemeClr val="accent1"/>
+            </a:fillRef>
+            <a:effectRef idx="0">
+              <a:schemeClr val="accent1"/>
+            </a:effectRef>
+            <a:fontRef idx="minor">
+              <a:schemeClr val="lt1"/>
+            </a:fontRef>
+          </p:style>
+          <p:txBody>
+            <a:bodyPr rtlCol="0" anchor="ctr"/>
+            <a:lstStyle/>
+            <a:p>
+              <a:pPr algn="ctr"/>
+              <a:endParaRPr lang="ko-KR" altLang="en-US">
+                <a:solidFill>
+                  <a:schemeClr val="tx1"/>
+                </a:solidFill>
+              </a:endParaRPr>
+            </a:p>
+          </p:txBody>
+        </p:sp>
+      </p:grpSp>
+      <p:sp>
+        <p:nvSpPr>
+          <p:cNvPr id="29" name="타원 28"/>
+          <p:cNvSpPr/>
+          <p:nvPr/>
+        </p:nvSpPr>
+        <p:spPr>
+          <a:xfrm>
+            <a:off x="6084168" y="4005064"/>
+            <a:ext cx="1512168" cy="1512168"/>
+          </a:xfrm>
+          <a:prstGeom prst="ellipse">
+            <a:avLst/>
+          </a:prstGeom>
+          <a:solidFill>
+            <a:schemeClr val="accent3">
+              <a:lumMod val="60000"/>
+              <a:lumOff val="40000"/>
+            </a:schemeClr>
+          </a:solidFill>
+          <a:ln>
+            <a:noFill/>
+          </a:ln>
+        </p:spPr>
+        <p:style>
+          <a:lnRef idx="2">
+            <a:schemeClr val="accent1">
+              <a:shade val="50000"/>
+            </a:schemeClr>
+          </a:lnRef>
+          <a:fillRef idx="1">
+            <a:schemeClr val="accent1"/>
+          </a:fillRef>
+          <a:effectRef idx="0">
+            <a:schemeClr val="accent1"/>
+          </a:effectRef>
+          <a:fontRef idx="minor">
+            <a:schemeClr val="lt1"/>
+          </a:fontRef>
+        </p:style>
+        <p:txBody>
+          <a:bodyPr rtlCol="0" anchor="ctr"/>
+          <a:lstStyle/>
+          <a:p>
+            <a:pPr algn="ctr"/>
+            <a:endParaRPr lang="ko-KR" altLang="en-US"/>
+          </a:p>
+        </p:txBody>
+      </p:sp>
+      <p:sp>
+        <p:nvSpPr>
+          <p:cNvPr id="30" name="타원 29"/>
+          <p:cNvSpPr/>
+          <p:nvPr/>
+        </p:nvSpPr>
+        <p:spPr>
+          <a:xfrm>
+            <a:off x="6188456" y="4109352"/>
+            <a:ext cx="1303593" cy="1303593"/>
+          </a:xfrm>
+          <a:prstGeom prst="ellipse">
+            <a:avLst/>
+          </a:prstGeom>
+          <a:solidFill>
+            <a:schemeClr val="bg1"/>
+          </a:solidFill>
+          <a:ln>
+            <a:noFill/>
+          </a:ln>
+        </p:spPr>
+        <p:style>
+          <a:lnRef idx="2">
+            <a:schemeClr val="accent1">
+              <a:shade val="50000"/>
+            </a:schemeClr>
+          </a:lnRef>
+          <a:fillRef idx="1">
+            <a:schemeClr val="accent1"/>
+          </a:fillRef>
+          <a:effectRef idx="0">
+            <a:schemeClr val="accent1"/>
+          </a:effectRef>
+          <a:fontRef idx="minor">
+            <a:schemeClr val="lt1"/>
+          </a:fontRef>
+        </p:style>
+        <p:txBody>
+          <a:bodyPr rtlCol="0" anchor="ctr"/>
+          <a:lstStyle/>
+          <a:p>
+            <a:pPr algn="ctr"/>
+            <a:endParaRPr lang="ko-KR" altLang="en-US"/>
+          </a:p>
+        </p:txBody>
+      </p:sp>
+      <p:sp>
+        <p:nvSpPr>
+          <p:cNvPr id="27" name="원형 화살표 26"/>
+          <p:cNvSpPr/>
+          <p:nvPr/>
+        </p:nvSpPr>
+        <p:spPr>
+          <a:xfrm>
+            <a:off x="6295454" y="4216350"/>
+            <a:ext cx="1089596" cy="1089596"/>
+          </a:xfrm>
+          <a:prstGeom prst="circularArrow">
+            <a:avLst>
+              <a:gd name="adj1" fmla="val 17804"/>
+              <a:gd name="adj2" fmla="val 1640854"/>
+              <a:gd name="adj3" fmla="val 18293065"/>
+              <a:gd name="adj4" fmla="val 2973501"/>
+              <a:gd name="adj5" fmla="val 18368"/>
+            </a:avLst>
+          </a:prstGeom>
+          <a:solidFill>
+            <a:schemeClr val="accent3">
+              <a:lumMod val="75000"/>
+            </a:schemeClr>
+          </a:solidFill>
+          <a:ln>
+            <a:noFill/>
+          </a:ln>
+        </p:spPr>
+        <p:style>
+          <a:lnRef idx="2">
+            <a:schemeClr val="accent3">
+              <a:shade val="50000"/>
+            </a:schemeClr>
+          </a:lnRef>
+          <a:fillRef idx="1">
+            <a:schemeClr val="accent3"/>
+          </a:fillRef>
+          <a:effectRef idx="0">
+            <a:schemeClr val="accent3"/>
+          </a:effectRef>
+          <a:fontRef idx="minor">
+            <a:schemeClr val="lt1"/>
+          </a:fontRef>
+        </p:style>
+        <p:txBody>
+          <a:bodyPr rtlCol="0" anchor="ctr"/>
+          <a:lstStyle/>
+          <a:p>
+            <a:pPr algn="ctr"/>
+            <a:endParaRPr lang="ko-KR" altLang="en-US">
+              <a:solidFill>
+                <a:schemeClr val="tx1"/>
+              </a:solidFill>
+            </a:endParaRPr>
+          </a:p>
+        </p:txBody>
+      </p:sp>
+      <p:grpSp>
+        <p:nvGrpSpPr>
+          <p:cNvPr id="9" name="그룹 41"/>
+          <p:cNvGrpSpPr/>
+          <p:nvPr/>
+        </p:nvGrpSpPr>
+        <p:grpSpPr>
+          <a:xfrm>
+            <a:off x="2195736" y="4077072"/>
+            <a:ext cx="1512168" cy="1512168"/>
+            <a:chOff x="2195736" y="4077072"/>
+            <a:chExt cx="1512168" cy="1512168"/>
+          </a:xfrm>
+        </p:grpSpPr>
+        <p:sp>
+          <p:nvSpPr>
+            <p:cNvPr id="35" name="타원 34"/>
+            <p:cNvSpPr/>
+            <p:nvPr/>
+          </p:nvSpPr>
+          <p:spPr>
+            <a:xfrm rot="10800000">
+              <a:off x="2195736" y="4077072"/>
+              <a:ext cx="1512168" cy="1512168"/>
+            </a:xfrm>
+            <a:prstGeom prst="ellipse">
+              <a:avLst/>
+            </a:prstGeom>
+            <a:solidFill>
+              <a:schemeClr val="accent3">
+                <a:lumMod val="60000"/>
+                <a:lumOff val="40000"/>
+              </a:schemeClr>
+            </a:solidFill>
+            <a:ln>
+              <a:noFill/>
+            </a:ln>
+          </p:spPr>
+          <p:style>
+            <a:lnRef idx="2">
+              <a:schemeClr val="accent1">
+                <a:shade val="50000"/>
+              </a:schemeClr>
+            </a:lnRef>
+            <a:fillRef idx="1">
+              <a:schemeClr val="accent1"/>
+            </a:fillRef>
+            <a:effectRef idx="0">
+              <a:schemeClr val="accent1"/>
+            </a:effectRef>
+            <a:fontRef idx="minor">
+              <a:schemeClr val="lt1"/>
+            </a:fontRef>
+          </p:style>
+          <p:txBody>
+            <a:bodyPr rtlCol="0" anchor="ctr"/>
+            <a:lstStyle/>
+            <a:p>
+              <a:pPr algn="ctr"/>
+              <a:endParaRPr lang="ko-KR" altLang="en-US"/>
+            </a:p>
+          </p:txBody>
+        </p:sp>
+        <p:sp>
+          <p:nvSpPr>
+            <p:cNvPr id="36" name="타원 35"/>
+            <p:cNvSpPr/>
+            <p:nvPr/>
+          </p:nvSpPr>
+          <p:spPr>
+            <a:xfrm rot="10800000">
+              <a:off x="2300023" y="4181360"/>
+              <a:ext cx="1303593" cy="1303593"/>
+            </a:xfrm>
+            <a:prstGeom prst="ellipse">
+              <a:avLst/>
+            </a:prstGeom>
+            <a:solidFill>
+              <a:schemeClr val="accent3">
+                <a:lumMod val="60000"/>
+                <a:lumOff val="40000"/>
+              </a:schemeClr>
+            </a:solidFill>
+            <a:ln>
+              <a:noFill/>
+            </a:ln>
+          </p:spPr>
+          <p:style>
+            <a:lnRef idx="2">
+              <a:schemeClr val="accent1">
+                <a:shade val="50000"/>
+              </a:schemeClr>
+            </a:lnRef>
+            <a:fillRef idx="1">
+              <a:schemeClr val="accent1"/>
+            </a:fillRef>
+            <a:effectRef idx="0">
+              <a:schemeClr val="accent1"/>
+            </a:effectRef>
+            <a:fontRef idx="minor">
+              <a:schemeClr val="lt1"/>
+            </a:fontRef>
+          </p:style>
+          <p:txBody>
+            <a:bodyPr rtlCol="0" anchor="ctr"/>
+            <a:lstStyle/>
+            <a:p>
+              <a:pPr algn="ctr"/>
+              <a:endParaRPr lang="ko-KR" altLang="en-US"/>
+            </a:p>
+          </p:txBody>
+        </p:sp>
+        <p:grpSp>
+          <p:nvGrpSpPr>
+            <p:cNvPr id="10" name="그룹 40"/>
+            <p:cNvGrpSpPr/>
+            <p:nvPr/>
+          </p:nvGrpSpPr>
+          <p:grpSpPr>
+            <a:xfrm>
+              <a:off x="2555776" y="4407793"/>
+              <a:ext cx="792086" cy="698026"/>
+              <a:chOff x="2494540" y="4293096"/>
+              <a:chExt cx="914558" cy="805955"/>
+            </a:xfrm>
+          </p:grpSpPr>
+          <p:sp>
+            <p:nvSpPr>
+              <p:cNvPr id="33" name="이등변 삼각형 32"/>
+              <p:cNvSpPr/>
+              <p:nvPr/>
+            </p:nvSpPr>
+            <p:spPr>
+              <a:xfrm>
+                <a:off x="2494540" y="4293096"/>
+                <a:ext cx="914558" cy="479549"/>
+              </a:xfrm>
+              <a:prstGeom prst="triangle">
+                <a:avLst>
+                  <a:gd name="adj" fmla="val 49479"/>
+                </a:avLst>
+              </a:prstGeom>
+              <a:solidFill>
+                <a:schemeClr val="accent3">
+                  <a:lumMod val="75000"/>
+                </a:schemeClr>
+              </a:solidFill>
+              <a:ln>
+                <a:noFill/>
+              </a:ln>
+            </p:spPr>
+            <p:style>
+              <a:lnRef idx="2">
+                <a:schemeClr val="accent1">
+                  <a:shade val="50000"/>
+                </a:schemeClr>
+              </a:lnRef>
+              <a:fillRef idx="1">
+                <a:schemeClr val="accent1"/>
+              </a:fillRef>
+              <a:effectRef idx="0">
+                <a:schemeClr val="accent1"/>
+              </a:effectRef>
+              <a:fontRef idx="minor">
+                <a:schemeClr val="lt1"/>
+              </a:fontRef>
+            </p:style>
+            <p:txBody>
+              <a:bodyPr rtlCol="0" anchor="ctr"/>
+              <a:lstStyle/>
+              <a:p>
+                <a:pPr algn="ctr"/>
+                <a:endParaRPr lang="ko-KR" altLang="en-US"/>
+              </a:p>
+            </p:txBody>
+          </p:sp>
+          <p:sp>
+            <p:nvSpPr>
+              <p:cNvPr id="38" name="직사각형 37"/>
+              <p:cNvSpPr/>
+              <p:nvPr/>
+            </p:nvSpPr>
+            <p:spPr>
+              <a:xfrm>
+                <a:off x="2496955" y="4766484"/>
+                <a:ext cx="332567" cy="332567"/>
+              </a:xfrm>
+              <a:prstGeom prst="rect">
+                <a:avLst/>
+              </a:prstGeom>
+              <a:solidFill>
+                <a:schemeClr val="accent3">
+                  <a:lumMod val="75000"/>
+                </a:schemeClr>
+              </a:solidFill>
+              <a:ln>
+                <a:noFill/>
+              </a:ln>
+            </p:spPr>
+            <p:style>
+              <a:lnRef idx="2">
+                <a:schemeClr val="accent1">
+                  <a:shade val="50000"/>
+                </a:schemeClr>
+              </a:lnRef>
+              <a:fillRef idx="1">
+                <a:schemeClr val="accent1"/>
+              </a:fillRef>
+              <a:effectRef idx="0">
+                <a:schemeClr val="accent1"/>
+              </a:effectRef>
+              <a:fontRef idx="minor">
+                <a:schemeClr val="lt1"/>
+              </a:fontRef>
+            </p:style>
+            <p:txBody>
+              <a:bodyPr rtlCol="0" anchor="ctr"/>
+              <a:lstStyle/>
+              <a:p>
+                <a:pPr algn="ctr"/>
+                <a:endParaRPr lang="ko-KR" altLang="en-US"/>
+              </a:p>
+            </p:txBody>
+          </p:sp>
+          <p:sp>
+            <p:nvSpPr>
+              <p:cNvPr id="39" name="직사각형 38"/>
+              <p:cNvSpPr/>
+              <p:nvPr/>
+            </p:nvSpPr>
+            <p:spPr>
+              <a:xfrm>
+                <a:off x="3071401" y="4766485"/>
+                <a:ext cx="332567" cy="332566"/>
+              </a:xfrm>
+              <a:prstGeom prst="rect">
+                <a:avLst/>
+              </a:prstGeom>
+              <a:solidFill>
+                <a:schemeClr val="accent3">
+                  <a:lumMod val="75000"/>
+                </a:schemeClr>
+              </a:solidFill>
+              <a:ln>
+                <a:noFill/>
+              </a:ln>
+            </p:spPr>
+            <p:style>
+              <a:lnRef idx="2">
+                <a:schemeClr val="accent1">
+                  <a:shade val="50000"/>
+                </a:schemeClr>
+              </a:lnRef>
+              <a:fillRef idx="1">
+                <a:schemeClr val="accent1"/>
+              </a:fillRef>
+              <a:effectRef idx="0">
+                <a:schemeClr val="accent1"/>
+              </a:effectRef>
+              <a:fontRef idx="minor">
+                <a:schemeClr val="lt1"/>
+              </a:fontRef>
+            </p:style>
+            <p:txBody>
+              <a:bodyPr rtlCol="0" anchor="ctr"/>
+              <a:lstStyle/>
+              <a:p>
+                <a:pPr algn="ctr"/>
+                <a:endParaRPr lang="ko-KR" altLang="en-US"/>
+              </a:p>
+            </p:txBody>
+          </p:sp>
+        </p:grpSp>
+      </p:grpSp>
+      <p:grpSp>
+        <p:nvGrpSpPr>
+          <p:cNvPr id="11" name="그룹 50"/>
+          <p:cNvGrpSpPr/>
+          <p:nvPr/>
+        </p:nvGrpSpPr>
+        <p:grpSpPr>
+          <a:xfrm>
+            <a:off x="4211960" y="4005064"/>
+            <a:ext cx="1512168" cy="1512168"/>
+            <a:chOff x="4211960" y="4005064"/>
+            <a:chExt cx="1512168" cy="1512168"/>
+          </a:xfrm>
+        </p:grpSpPr>
+        <p:sp>
+          <p:nvSpPr>
+            <p:cNvPr id="44" name="타원 43"/>
+            <p:cNvSpPr/>
+            <p:nvPr/>
+          </p:nvSpPr>
+          <p:spPr>
+            <a:xfrm>
+              <a:off x="4211960" y="4005064"/>
+              <a:ext cx="1512168" cy="1512168"/>
+            </a:xfrm>
+            <a:prstGeom prst="ellipse">
+              <a:avLst/>
+            </a:prstGeom>
+            <a:solidFill>
+              <a:schemeClr val="accent3">
+                <a:lumMod val="60000"/>
+                <a:lumOff val="40000"/>
+              </a:schemeClr>
+            </a:solidFill>
+            <a:ln>
+              <a:noFill/>
+            </a:ln>
+          </p:spPr>
+          <p:style>
+            <a:lnRef idx="2">
+              <a:schemeClr val="accent1">
+                <a:shade val="50000"/>
+              </a:schemeClr>
+            </a:lnRef>
+            <a:fillRef idx="1">
+              <a:schemeClr val="accent1"/>
+            </a:fillRef>
+            <a:effectRef idx="0">
+              <a:schemeClr val="accent1"/>
+            </a:effectRef>
+            <a:fontRef idx="minor">
+              <a:schemeClr val="lt1"/>
+            </a:fontRef>
+          </p:style>
+          <p:txBody>
+            <a:bodyPr rtlCol="0" anchor="ctr"/>
+            <a:lstStyle/>
+            <a:p>
+              <a:pPr algn="ctr"/>
+              <a:endParaRPr lang="ko-KR" altLang="en-US"/>
+            </a:p>
+          </p:txBody>
+        </p:sp>
+        <p:sp>
+          <p:nvSpPr>
+            <p:cNvPr id="45" name="타원 44"/>
+            <p:cNvSpPr/>
+            <p:nvPr/>
+          </p:nvSpPr>
+          <p:spPr>
+            <a:xfrm>
+              <a:off x="4316248" y="4109352"/>
+              <a:ext cx="1303593" cy="1303593"/>
+            </a:xfrm>
+            <a:prstGeom prst="ellipse">
+              <a:avLst/>
+            </a:prstGeom>
+            <a:solidFill>
+              <a:schemeClr val="accent3">
+                <a:lumMod val="60000"/>
+                <a:lumOff val="40000"/>
+              </a:schemeClr>
+            </a:solidFill>
+            <a:ln>
+              <a:noFill/>
+            </a:ln>
+          </p:spPr>
+          <p:style>
+            <a:lnRef idx="2">
+              <a:schemeClr val="accent1">
+                <a:shade val="50000"/>
+              </a:schemeClr>
+            </a:lnRef>
+            <a:fillRef idx="1">
+              <a:schemeClr val="accent1"/>
+            </a:fillRef>
+            <a:effectRef idx="0">
+              <a:schemeClr val="accent1"/>
+            </a:effectRef>
+            <a:fontRef idx="minor">
+              <a:schemeClr val="lt1"/>
+            </a:fontRef>
+          </p:style>
+          <p:txBody>
+            <a:bodyPr rtlCol="0" anchor="ctr"/>
+            <a:lstStyle/>
+            <a:p>
+              <a:pPr algn="ctr"/>
+              <a:endParaRPr lang="ko-KR" altLang="en-US"/>
+            </a:p>
+          </p:txBody>
+        </p:sp>
+        <p:grpSp>
+          <p:nvGrpSpPr>
+            <p:cNvPr id="12" name="그룹 48"/>
+            <p:cNvGrpSpPr/>
+            <p:nvPr/>
+          </p:nvGrpSpPr>
+          <p:grpSpPr>
+            <a:xfrm>
+              <a:off x="4556368" y="4349472"/>
+              <a:ext cx="823352" cy="823352"/>
+              <a:chOff x="4572000" y="4437112"/>
+              <a:chExt cx="720080" cy="720080"/>
+            </a:xfrm>
+            <a:solidFill>
+              <a:schemeClr val="accent3">
+                <a:lumMod val="75000"/>
+              </a:schemeClr>
+            </a:solidFill>
+          </p:grpSpPr>
+          <p:sp>
+            <p:nvSpPr>
+              <p:cNvPr id="47" name="모서리가 둥근 직사각형 46"/>
+              <p:cNvSpPr/>
+              <p:nvPr/>
+            </p:nvSpPr>
+            <p:spPr>
+              <a:xfrm>
+                <a:off x="4572000" y="4689140"/>
+                <a:ext cx="720080" cy="216024"/>
+              </a:xfrm>
+              <a:prstGeom prst="roundRect">
+                <a:avLst/>
+              </a:prstGeom>
+              <a:grpFill/>
+              <a:ln>
+                <a:noFill/>
+              </a:ln>
+            </p:spPr>
+            <p:style>
+              <a:lnRef idx="2">
+                <a:schemeClr val="accent3">
+                  <a:shade val="50000"/>
+                </a:schemeClr>
+              </a:lnRef>
+              <a:fillRef idx="1">
+                <a:schemeClr val="accent3"/>
+              </a:fillRef>
+              <a:effectRef idx="0">
+                <a:schemeClr val="accent3"/>
+              </a:effectRef>
+              <a:fontRef idx="minor">
+                <a:schemeClr val="lt1"/>
+              </a:fontRef>
+            </p:style>
+            <p:txBody>
+              <a:bodyPr rtlCol="0" anchor="ctr"/>
+              <a:lstStyle/>
+              <a:p>
+                <a:pPr algn="ctr"/>
+                <a:endParaRPr lang="ko-KR" altLang="en-US"/>
+              </a:p>
+            </p:txBody>
+          </p:sp>
+          <p:sp>
+            <p:nvSpPr>
+              <p:cNvPr id="48" name="모서리가 둥근 직사각형 47"/>
+              <p:cNvSpPr/>
+              <p:nvPr/>
+            </p:nvSpPr>
+            <p:spPr>
+              <a:xfrm rot="5400000">
+                <a:off x="4572000" y="4689140"/>
+                <a:ext cx="720080" cy="216024"/>
+              </a:xfrm>
+              <a:prstGeom prst="roundRect">
+                <a:avLst/>
+              </a:prstGeom>
+              <a:grpFill/>
+              <a:ln>
+                <a:noFill/>
+              </a:ln>
+            </p:spPr>
+            <p:style>
+              <a:lnRef idx="2">
+                <a:schemeClr val="accent3">
+                  <a:shade val="50000"/>
+                </a:schemeClr>
+              </a:lnRef>
+              <a:fillRef idx="1">
+                <a:schemeClr val="accent3"/>
+              </a:fillRef>
+              <a:effectRef idx="0">
+                <a:schemeClr val="accent3"/>
+              </a:effectRef>
+              <a:fontRef idx="minor">
+                <a:schemeClr val="lt1"/>
+              </a:fontRef>
+            </p:style>
+            <p:txBody>
+              <a:bodyPr rtlCol="0" anchor="ctr"/>
+              <a:lstStyle/>
+              <a:p>
+                <a:pPr algn="ctr"/>
+                <a:endParaRPr lang="ko-KR" altLang="en-US"/>
+              </a:p>
+            </p:txBody>
+          </p:sp>
+        </p:grpSp>
+      </p:grpSp>
+    </p:spTree>
+  </p:cSld>
+  <p:clrMapOvr>
+    <a:masterClrMapping/>
+  </p:clrMapOvr>
+  <p:timing>
+    <p:tnLst>
+      <p:par>
+        <p:cTn id="1" dur="indefinite" restart="never" nodeType="tmRoot"/>
+      </p:par>
+    </p:tnLst>
+  </p:timing>
+</p:sld>
+</file>
+
+<file path=ppt/slides/slide3.xml><?xml version="1.0" encoding="utf-8"?>
+<p:sld xmlns:a="http://schemas.openxmlformats.org/drawingml/2006/main" xmlns:r="http://schemas.openxmlformats.org/officeDocument/2006/relationships" xmlns:p="http://schemas.openxmlformats.org/presentationml/2006/main">
+  <p:cSld>
+    <p:spTree>
+      <p:nvGrpSpPr>
+        <p:cNvPr id="1" name=""/>
+        <p:cNvGrpSpPr/>
+        <p:nvPr/>
+      </p:nvGrpSpPr>
+      <p:grpSpPr>
+        <a:xfrm>
+          <a:off x="0" y="0"/>
+          <a:ext cx="0" cy="0"/>
+          <a:chOff x="0" y="0"/>
+          <a:chExt cx="0" cy="0"/>
+        </a:xfrm>
+      </p:grpSpPr>
+      <p:grpSp>
+        <p:nvGrpSpPr>
+          <p:cNvPr id="2" name="그룹 7"/>
+          <p:cNvGrpSpPr/>
+          <p:nvPr/>
+        </p:nvGrpSpPr>
+        <p:grpSpPr>
+          <a:xfrm>
+            <a:off x="4211960" y="1628800"/>
+            <a:ext cx="1512168" cy="1512168"/>
+            <a:chOff x="1835696" y="1556792"/>
+            <a:chExt cx="2088232" cy="2088232"/>
+          </a:xfrm>
+        </p:grpSpPr>
+        <p:sp>
+          <p:nvSpPr>
+            <p:cNvPr id="4" name="타원 3"/>
+            <p:cNvSpPr/>
+            <p:nvPr/>
+          </p:nvSpPr>
+          <p:spPr>
+            <a:xfrm>
+              <a:off x="1835696" y="1556792"/>
+              <a:ext cx="2088232" cy="2088232"/>
+            </a:xfrm>
+            <a:prstGeom prst="ellipse">
+              <a:avLst/>
+            </a:prstGeom>
+            <a:solidFill>
+              <a:schemeClr val="accent3">
+                <a:lumMod val="50000"/>
+              </a:schemeClr>
+            </a:solidFill>
+            <a:ln>
+              <a:noFill/>
+            </a:ln>
+          </p:spPr>
+          <p:style>
+            <a:lnRef idx="2">
+              <a:schemeClr val="accent1">
+                <a:shade val="50000"/>
+              </a:schemeClr>
+            </a:lnRef>
+            <a:fillRef idx="1">
+              <a:schemeClr val="accent1"/>
+            </a:fillRef>
+            <a:effectRef idx="0">
+              <a:schemeClr val="accent1"/>
+            </a:effectRef>
+            <a:fontRef idx="minor">
+              <a:schemeClr val="lt1"/>
+            </a:fontRef>
+          </p:style>
+          <p:txBody>
+            <a:bodyPr rtlCol="0" anchor="ctr"/>
+            <a:lstStyle/>
+            <a:p>
+              <a:pPr algn="ctr"/>
+              <a:endParaRPr lang="ko-KR" altLang="en-US"/>
+            </a:p>
+          </p:txBody>
+        </p:sp>
+        <p:sp>
+          <p:nvSpPr>
+            <p:cNvPr id="5" name="타원 4"/>
+            <p:cNvSpPr/>
+            <p:nvPr/>
+          </p:nvSpPr>
+          <p:spPr>
+            <a:xfrm>
+              <a:off x="1979712" y="1700808"/>
+              <a:ext cx="1800200" cy="1800200"/>
+            </a:xfrm>
+            <a:prstGeom prst="ellipse">
+              <a:avLst/>
+            </a:prstGeom>
+            <a:solidFill>
+              <a:schemeClr val="accent3">
+                <a:lumMod val="50000"/>
+              </a:schemeClr>
+            </a:solidFill>
+            <a:ln>
+              <a:noFill/>
+            </a:ln>
+          </p:spPr>
+          <p:style>
+            <a:lnRef idx="2">
+              <a:schemeClr val="accent1">
+                <a:shade val="50000"/>
+              </a:schemeClr>
+            </a:lnRef>
+            <a:fillRef idx="1">
+              <a:schemeClr val="accent1"/>
+            </a:fillRef>
+            <a:effectRef idx="0">
+              <a:schemeClr val="accent1"/>
+            </a:effectRef>
+            <a:fontRef idx="minor">
+              <a:schemeClr val="lt1"/>
+            </a:fontRef>
+          </p:style>
+          <p:txBody>
+            <a:bodyPr rtlCol="0" anchor="ctr"/>
+            <a:lstStyle/>
+            <a:p>
+              <a:pPr algn="ctr"/>
+              <a:endParaRPr lang="ko-KR" altLang="en-US"/>
+            </a:p>
+          </p:txBody>
+        </p:sp>
+        <p:sp>
+          <p:nvSpPr>
+            <p:cNvPr id="6" name="갈매기형 수장 5"/>
+            <p:cNvSpPr/>
+            <p:nvPr/>
+          </p:nvSpPr>
+          <p:spPr>
+            <a:xfrm>
+              <a:off x="2483768" y="2005205"/>
+              <a:ext cx="936104" cy="1191406"/>
+            </a:xfrm>
+            <a:prstGeom prst="chevron">
+              <a:avLst>
+                <a:gd name="adj" fmla="val 55328"/>
+              </a:avLst>
+            </a:prstGeom>
+            <a:solidFill>
+              <a:schemeClr val="accent3">
+                <a:lumMod val="75000"/>
+              </a:schemeClr>
+            </a:solidFill>
+            <a:ln>
+              <a:noFill/>
+            </a:ln>
+          </p:spPr>
+          <p:style>
+            <a:lnRef idx="2">
+              <a:schemeClr val="accent1">
+                <a:shade val="50000"/>
+              </a:schemeClr>
+            </a:lnRef>
+            <a:fillRef idx="1">
+              <a:schemeClr val="accent1"/>
+            </a:fillRef>
+            <a:effectRef idx="0">
+              <a:schemeClr val="accent1"/>
+            </a:effectRef>
+            <a:fontRef idx="minor">
+              <a:schemeClr val="lt1"/>
+            </a:fontRef>
+          </p:style>
+          <p:txBody>
+            <a:bodyPr rtlCol="0" anchor="ctr"/>
+            <a:lstStyle/>
+            <a:p>
+              <a:pPr algn="ctr"/>
+              <a:endParaRPr lang="ko-KR" altLang="en-US">
+                <a:solidFill>
+                  <a:schemeClr val="tx1"/>
+                </a:solidFill>
+              </a:endParaRPr>
+            </a:p>
+          </p:txBody>
+        </p:sp>
+      </p:grpSp>
+      <p:grpSp>
+        <p:nvGrpSpPr>
+          <p:cNvPr id="3" name="그룹 12"/>
+          <p:cNvGrpSpPr/>
+          <p:nvPr/>
+        </p:nvGrpSpPr>
+        <p:grpSpPr>
+          <a:xfrm>
+            <a:off x="6084168" y="1628800"/>
+            <a:ext cx="1512168" cy="1512168"/>
+            <a:chOff x="1835696" y="1556792"/>
+            <a:chExt cx="2088232" cy="2088232"/>
+          </a:xfrm>
+        </p:grpSpPr>
+        <p:sp>
+          <p:nvSpPr>
+            <p:cNvPr id="14" name="타원 13"/>
+            <p:cNvSpPr/>
+            <p:nvPr/>
+          </p:nvSpPr>
+          <p:spPr>
+            <a:xfrm>
+              <a:off x="1835696" y="1556792"/>
+              <a:ext cx="2088232" cy="2088232"/>
+            </a:xfrm>
+            <a:prstGeom prst="ellipse">
+              <a:avLst/>
+            </a:prstGeom>
+            <a:solidFill>
+              <a:schemeClr val="accent3">
+                <a:lumMod val="50000"/>
+              </a:schemeClr>
+            </a:solidFill>
+            <a:ln>
+              <a:noFill/>
+            </a:ln>
+          </p:spPr>
+          <p:style>
+            <a:lnRef idx="2">
+              <a:schemeClr val="accent1">
+                <a:shade val="50000"/>
+              </a:schemeClr>
+            </a:lnRef>
+            <a:fillRef idx="1">
+              <a:schemeClr val="accent1"/>
+            </a:fillRef>
+            <a:effectRef idx="0">
+              <a:schemeClr val="accent1"/>
+            </a:effectRef>
+            <a:fontRef idx="minor">
+              <a:schemeClr val="lt1"/>
+            </a:fontRef>
+          </p:style>
+          <p:txBody>
+            <a:bodyPr rtlCol="0" anchor="ctr"/>
+            <a:lstStyle/>
+            <a:p>
+              <a:pPr algn="ctr"/>
+              <a:endParaRPr lang="ko-KR" altLang="en-US"/>
+            </a:p>
+          </p:txBody>
+        </p:sp>
+        <p:sp>
+          <p:nvSpPr>
+            <p:cNvPr id="15" name="타원 14"/>
+            <p:cNvSpPr/>
+            <p:nvPr/>
+          </p:nvSpPr>
+          <p:spPr>
+            <a:xfrm>
+              <a:off x="1979712" y="1700808"/>
+              <a:ext cx="1800200" cy="1800200"/>
+            </a:xfrm>
+            <a:prstGeom prst="ellipse">
+              <a:avLst/>
+            </a:prstGeom>
+            <a:solidFill>
+              <a:schemeClr val="accent3">
+                <a:lumMod val="50000"/>
+              </a:schemeClr>
+            </a:solidFill>
+            <a:ln>
+              <a:noFill/>
+            </a:ln>
+          </p:spPr>
+          <p:style>
+            <a:lnRef idx="2">
+              <a:schemeClr val="accent1">
+                <a:shade val="50000"/>
+              </a:schemeClr>
+            </a:lnRef>
+            <a:fillRef idx="1">
+              <a:schemeClr val="accent1"/>
+            </a:fillRef>
+            <a:effectRef idx="0">
+              <a:schemeClr val="accent1"/>
+            </a:effectRef>
+            <a:fontRef idx="minor">
+              <a:schemeClr val="lt1"/>
+            </a:fontRef>
+          </p:style>
+          <p:txBody>
+            <a:bodyPr rtlCol="0" anchor="ctr"/>
+            <a:lstStyle/>
+            <a:p>
+              <a:pPr algn="ctr"/>
+              <a:endParaRPr lang="ko-KR" altLang="en-US"/>
+            </a:p>
+          </p:txBody>
+        </p:sp>
+        <p:sp>
+          <p:nvSpPr>
+            <p:cNvPr id="16" name="갈매기형 수장 15"/>
+            <p:cNvSpPr/>
+            <p:nvPr/>
+          </p:nvSpPr>
+          <p:spPr>
+            <a:xfrm>
+              <a:off x="2396701" y="2005205"/>
+              <a:ext cx="623279" cy="1191407"/>
+            </a:xfrm>
+            <a:prstGeom prst="chevron">
+              <a:avLst>
+                <a:gd name="adj" fmla="val 55328"/>
+              </a:avLst>
+            </a:prstGeom>
+            <a:solidFill>
+              <a:schemeClr val="accent3">
+                <a:lumMod val="75000"/>
+              </a:schemeClr>
+            </a:solidFill>
+            <a:ln>
+              <a:noFill/>
+            </a:ln>
+          </p:spPr>
+          <p:style>
+            <a:lnRef idx="2">
+              <a:schemeClr val="accent1">
+                <a:shade val="50000"/>
+              </a:schemeClr>
+            </a:lnRef>
+            <a:fillRef idx="1">
+              <a:schemeClr val="accent1"/>
+            </a:fillRef>
+            <a:effectRef idx="0">
+              <a:schemeClr val="accent1"/>
+            </a:effectRef>
+            <a:fontRef idx="minor">
+              <a:schemeClr val="lt1"/>
+            </a:fontRef>
+          </p:style>
+          <p:txBody>
+            <a:bodyPr rtlCol="0" anchor="ctr"/>
+            <a:lstStyle/>
+            <a:p>
+              <a:pPr algn="ctr"/>
+              <a:endParaRPr lang="ko-KR" altLang="en-US">
+                <a:solidFill>
+                  <a:schemeClr val="tx1"/>
+                </a:solidFill>
+              </a:endParaRPr>
+            </a:p>
+          </p:txBody>
+        </p:sp>
+        <p:sp>
+          <p:nvSpPr>
+            <p:cNvPr id="17" name="갈매기형 수장 16"/>
+            <p:cNvSpPr/>
+            <p:nvPr/>
+          </p:nvSpPr>
+          <p:spPr>
+            <a:xfrm>
+              <a:off x="2918759" y="2005205"/>
+              <a:ext cx="623279" cy="1191407"/>
+            </a:xfrm>
+            <a:prstGeom prst="chevron">
+              <a:avLst>
+                <a:gd name="adj" fmla="val 55328"/>
+              </a:avLst>
+            </a:prstGeom>
+            <a:solidFill>
+              <a:schemeClr val="accent3">
+                <a:lumMod val="75000"/>
+              </a:schemeClr>
+            </a:solidFill>
+            <a:ln>
+              <a:noFill/>
+            </a:ln>
+          </p:spPr>
+          <p:style>
+            <a:lnRef idx="2">
+              <a:schemeClr val="accent1">
+                <a:shade val="50000"/>
+              </a:schemeClr>
+            </a:lnRef>
+            <a:fillRef idx="1">
+              <a:schemeClr val="accent1"/>
+            </a:fillRef>
+            <a:effectRef idx="0">
+              <a:schemeClr val="accent1"/>
+            </a:effectRef>
+            <a:fontRef idx="minor">
+              <a:schemeClr val="lt1"/>
+            </a:fontRef>
+          </p:style>
+          <p:txBody>
+            <a:bodyPr rtlCol="0" anchor="ctr"/>
+            <a:lstStyle/>
+            <a:p>
+              <a:pPr algn="ctr"/>
+              <a:endParaRPr lang="ko-KR" altLang="en-US">
+                <a:solidFill>
+                  <a:schemeClr val="tx1"/>
+                </a:solidFill>
+              </a:endParaRPr>
+            </a:p>
+          </p:txBody>
+        </p:sp>
+      </p:grpSp>
+      <p:grpSp>
+        <p:nvGrpSpPr>
+          <p:cNvPr id="7" name="그룹 17"/>
+          <p:cNvGrpSpPr/>
+          <p:nvPr/>
+        </p:nvGrpSpPr>
+        <p:grpSpPr>
+          <a:xfrm rot="10800000">
+            <a:off x="323528" y="1628800"/>
+            <a:ext cx="1512168" cy="1512168"/>
+            <a:chOff x="1835696" y="1556792"/>
+            <a:chExt cx="2088232" cy="2088232"/>
+          </a:xfrm>
+        </p:grpSpPr>
+        <p:sp>
+          <p:nvSpPr>
+            <p:cNvPr id="19" name="타원 18"/>
+            <p:cNvSpPr/>
+            <p:nvPr/>
+          </p:nvSpPr>
+          <p:spPr>
+            <a:xfrm>
+              <a:off x="1835696" y="1556792"/>
+              <a:ext cx="2088232" cy="2088232"/>
+            </a:xfrm>
+            <a:prstGeom prst="ellipse">
+              <a:avLst/>
+            </a:prstGeom>
+            <a:solidFill>
+              <a:schemeClr val="accent3">
+                <a:lumMod val="50000"/>
+              </a:schemeClr>
+            </a:solidFill>
+            <a:ln>
+              <a:noFill/>
+            </a:ln>
+          </p:spPr>
+          <p:style>
+            <a:lnRef idx="2">
+              <a:schemeClr val="accent1">
+                <a:shade val="50000"/>
+              </a:schemeClr>
+            </a:lnRef>
+            <a:fillRef idx="1">
+              <a:schemeClr val="accent1"/>
+            </a:fillRef>
+            <a:effectRef idx="0">
+              <a:schemeClr val="accent1"/>
+            </a:effectRef>
+            <a:fontRef idx="minor">
+              <a:schemeClr val="lt1"/>
+            </a:fontRef>
+          </p:style>
+          <p:txBody>
+            <a:bodyPr rtlCol="0" anchor="ctr"/>
+            <a:lstStyle/>
+            <a:p>
+              <a:pPr algn="ctr"/>
+              <a:endParaRPr lang="ko-KR" altLang="en-US"/>
+            </a:p>
+          </p:txBody>
+        </p:sp>
+        <p:sp>
+          <p:nvSpPr>
+            <p:cNvPr id="20" name="타원 19"/>
+            <p:cNvSpPr/>
+            <p:nvPr/>
+          </p:nvSpPr>
+          <p:spPr>
+            <a:xfrm>
+              <a:off x="1979712" y="1700808"/>
+              <a:ext cx="1800200" cy="1800200"/>
+            </a:xfrm>
+            <a:prstGeom prst="ellipse">
+              <a:avLst/>
+            </a:prstGeom>
+            <a:solidFill>
+              <a:schemeClr val="accent3">
+                <a:lumMod val="50000"/>
+              </a:schemeClr>
+            </a:solidFill>
+            <a:ln>
+              <a:noFill/>
+            </a:ln>
+          </p:spPr>
+          <p:style>
+            <a:lnRef idx="2">
+              <a:schemeClr val="accent1">
+                <a:shade val="50000"/>
+              </a:schemeClr>
+            </a:lnRef>
+            <a:fillRef idx="1">
+              <a:schemeClr val="accent1"/>
+            </a:fillRef>
+            <a:effectRef idx="0">
+              <a:schemeClr val="accent1"/>
+            </a:effectRef>
+            <a:fontRef idx="minor">
+              <a:schemeClr val="lt1"/>
+            </a:fontRef>
+          </p:style>
+          <p:txBody>
+            <a:bodyPr rtlCol="0" anchor="ctr"/>
+            <a:lstStyle/>
+            <a:p>
+              <a:pPr algn="ctr"/>
+              <a:endParaRPr lang="ko-KR" altLang="en-US"/>
+            </a:p>
+          </p:txBody>
+        </p:sp>
+        <p:sp>
+          <p:nvSpPr>
+            <p:cNvPr id="21" name="갈매기형 수장 20"/>
+            <p:cNvSpPr/>
+            <p:nvPr/>
+          </p:nvSpPr>
+          <p:spPr>
+            <a:xfrm>
+              <a:off x="2396701" y="2005205"/>
+              <a:ext cx="623279" cy="1191407"/>
+            </a:xfrm>
+            <a:prstGeom prst="chevron">
+              <a:avLst>
+                <a:gd name="adj" fmla="val 55328"/>
+              </a:avLst>
+            </a:prstGeom>
+            <a:solidFill>
+              <a:schemeClr val="accent3">
+                <a:lumMod val="75000"/>
+              </a:schemeClr>
+            </a:solidFill>
+            <a:ln>
+              <a:noFill/>
+            </a:ln>
+          </p:spPr>
+          <p:style>
+            <a:lnRef idx="2">
+              <a:schemeClr val="accent1">
+                <a:shade val="50000"/>
+              </a:schemeClr>
+            </a:lnRef>
+            <a:fillRef idx="1">
+              <a:schemeClr val="accent1"/>
+            </a:fillRef>
+            <a:effectRef idx="0">
+              <a:schemeClr val="accent1"/>
+            </a:effectRef>
+            <a:fontRef idx="minor">
+              <a:schemeClr val="lt1"/>
+            </a:fontRef>
+          </p:style>
+          <p:txBody>
+            <a:bodyPr rtlCol="0" anchor="ctr"/>
+            <a:lstStyle/>
+            <a:p>
+              <a:pPr algn="ctr"/>
+              <a:endParaRPr lang="ko-KR" altLang="en-US">
+                <a:solidFill>
+                  <a:schemeClr val="tx1"/>
+                </a:solidFill>
+              </a:endParaRPr>
+            </a:p>
+          </p:txBody>
+        </p:sp>
+        <p:sp>
+          <p:nvSpPr>
+            <p:cNvPr id="22" name="갈매기형 수장 21"/>
+            <p:cNvSpPr/>
+            <p:nvPr/>
+          </p:nvSpPr>
+          <p:spPr>
+            <a:xfrm>
+              <a:off x="2918759" y="2005205"/>
+              <a:ext cx="623279" cy="1191407"/>
+            </a:xfrm>
+            <a:prstGeom prst="chevron">
+              <a:avLst>
+                <a:gd name="adj" fmla="val 55328"/>
+              </a:avLst>
+            </a:prstGeom>
+            <a:solidFill>
+              <a:schemeClr val="accent3">
+                <a:lumMod val="75000"/>
+              </a:schemeClr>
+            </a:solidFill>
+            <a:ln>
+              <a:noFill/>
+            </a:ln>
+          </p:spPr>
+          <p:style>
+            <a:lnRef idx="2">
+              <a:schemeClr val="accent1">
+                <a:shade val="50000"/>
+              </a:schemeClr>
+            </a:lnRef>
+            <a:fillRef idx="1">
+              <a:schemeClr val="accent1"/>
+            </a:fillRef>
+            <a:effectRef idx="0">
+              <a:schemeClr val="accent1"/>
+            </a:effectRef>
+            <a:fontRef idx="minor">
+              <a:schemeClr val="lt1"/>
+            </a:fontRef>
+          </p:style>
+          <p:txBody>
+            <a:bodyPr rtlCol="0" anchor="ctr"/>
+            <a:lstStyle/>
+            <a:p>
+              <a:pPr algn="ctr"/>
+              <a:endParaRPr lang="ko-KR" altLang="en-US">
+                <a:solidFill>
+                  <a:schemeClr val="tx1"/>
+                </a:solidFill>
+              </a:endParaRPr>
+            </a:p>
+          </p:txBody>
+        </p:sp>
+      </p:grpSp>
+      <p:grpSp>
+        <p:nvGrpSpPr>
+          <p:cNvPr id="8" name="그룹 22"/>
+          <p:cNvGrpSpPr/>
+          <p:nvPr/>
+        </p:nvGrpSpPr>
+        <p:grpSpPr>
+          <a:xfrm rot="10800000">
+            <a:off x="2195736" y="1628800"/>
+            <a:ext cx="1512168" cy="1512168"/>
+            <a:chOff x="1835696" y="1556792"/>
+            <a:chExt cx="2088232" cy="2088232"/>
+          </a:xfrm>
+        </p:grpSpPr>
+        <p:sp>
+          <p:nvSpPr>
+            <p:cNvPr id="24" name="타원 23"/>
+            <p:cNvSpPr/>
+            <p:nvPr/>
+          </p:nvSpPr>
+          <p:spPr>
+            <a:xfrm>
+              <a:off x="1835696" y="1556792"/>
+              <a:ext cx="2088232" cy="2088232"/>
+            </a:xfrm>
+            <a:prstGeom prst="ellipse">
+              <a:avLst/>
+            </a:prstGeom>
+            <a:solidFill>
+              <a:schemeClr val="accent3">
+                <a:lumMod val="50000"/>
+              </a:schemeClr>
+            </a:solidFill>
+            <a:ln>
+              <a:noFill/>
+            </a:ln>
+          </p:spPr>
+          <p:style>
+            <a:lnRef idx="2">
+              <a:schemeClr val="accent1">
+                <a:shade val="50000"/>
+              </a:schemeClr>
+            </a:lnRef>
+            <a:fillRef idx="1">
+              <a:schemeClr val="accent1"/>
+            </a:fillRef>
+            <a:effectRef idx="0">
+              <a:schemeClr val="accent1"/>
+            </a:effectRef>
+            <a:fontRef idx="minor">
+              <a:schemeClr val="lt1"/>
+            </a:fontRef>
+          </p:style>
+          <p:txBody>
+            <a:bodyPr rtlCol="0" anchor="ctr"/>
+            <a:lstStyle/>
+            <a:p>
+              <a:pPr algn="ctr"/>
+              <a:endParaRPr lang="ko-KR" altLang="en-US"/>
+            </a:p>
+          </p:txBody>
+        </p:sp>
+        <p:sp>
+          <p:nvSpPr>
+            <p:cNvPr id="25" name="타원 24"/>
+            <p:cNvSpPr/>
+            <p:nvPr/>
+          </p:nvSpPr>
+          <p:spPr>
+            <a:xfrm>
+              <a:off x="1979712" y="1700808"/>
+              <a:ext cx="1800200" cy="1800200"/>
+            </a:xfrm>
+            <a:prstGeom prst="ellipse">
+              <a:avLst/>
+            </a:prstGeom>
+            <a:solidFill>
+              <a:schemeClr val="accent3">
+                <a:lumMod val="50000"/>
+              </a:schemeClr>
+            </a:solidFill>
+            <a:ln>
+              <a:noFill/>
+            </a:ln>
+          </p:spPr>
+          <p:style>
+            <a:lnRef idx="2">
+              <a:schemeClr val="accent1">
+                <a:shade val="50000"/>
+              </a:schemeClr>
+            </a:lnRef>
+            <a:fillRef idx="1">
+              <a:schemeClr val="accent1"/>
+            </a:fillRef>
+            <a:effectRef idx="0">
+              <a:schemeClr val="accent1"/>
+            </a:effectRef>
+            <a:fontRef idx="minor">
+              <a:schemeClr val="lt1"/>
+            </a:fontRef>
+          </p:style>
+          <p:txBody>
+            <a:bodyPr rtlCol="0" anchor="ctr"/>
+            <a:lstStyle/>
+            <a:p>
+              <a:pPr algn="ctr"/>
+              <a:endParaRPr lang="ko-KR" altLang="en-US"/>
+            </a:p>
+          </p:txBody>
+        </p:sp>
+        <p:sp>
+          <p:nvSpPr>
+            <p:cNvPr id="26" name="갈매기형 수장 25"/>
+            <p:cNvSpPr/>
+            <p:nvPr/>
+          </p:nvSpPr>
+          <p:spPr>
+            <a:xfrm>
+              <a:off x="2483768" y="2005205"/>
+              <a:ext cx="936104" cy="1191406"/>
+            </a:xfrm>
+            <a:prstGeom prst="chevron">
+              <a:avLst>
+                <a:gd name="adj" fmla="val 55328"/>
+              </a:avLst>
+            </a:prstGeom>
+            <a:solidFill>
+              <a:schemeClr val="accent3">
+                <a:lumMod val="75000"/>
+              </a:schemeClr>
+            </a:solidFill>
+            <a:ln>
+              <a:noFill/>
+            </a:ln>
+          </p:spPr>
+          <p:style>
+            <a:lnRef idx="2">
+              <a:schemeClr val="accent1">
+                <a:shade val="50000"/>
+              </a:schemeClr>
+            </a:lnRef>
+            <a:fillRef idx="1">
+              <a:schemeClr val="accent1"/>
+            </a:fillRef>
+            <a:effectRef idx="0">
+              <a:schemeClr val="accent1"/>
+            </a:effectRef>
+            <a:fontRef idx="minor">
+              <a:schemeClr val="lt1"/>
+            </a:fontRef>
+          </p:style>
+          <p:txBody>
+            <a:bodyPr rtlCol="0" anchor="ctr"/>
+            <a:lstStyle/>
+            <a:p>
+              <a:pPr algn="ctr"/>
+              <a:endParaRPr lang="ko-KR" altLang="en-US">
+                <a:solidFill>
+                  <a:schemeClr val="tx1"/>
+                </a:solidFill>
+              </a:endParaRPr>
+            </a:p>
+          </p:txBody>
+        </p:sp>
+      </p:grpSp>
+      <p:sp>
+        <p:nvSpPr>
+          <p:cNvPr id="29" name="타원 28"/>
+          <p:cNvSpPr/>
+          <p:nvPr/>
+        </p:nvSpPr>
+        <p:spPr>
+          <a:xfrm>
+            <a:off x="6084168" y="4005064"/>
+            <a:ext cx="1512168" cy="1512168"/>
+          </a:xfrm>
+          <a:prstGeom prst="ellipse">
+            <a:avLst/>
+          </a:prstGeom>
+          <a:solidFill>
+            <a:schemeClr val="accent3">
+              <a:lumMod val="60000"/>
+              <a:lumOff val="40000"/>
+            </a:schemeClr>
+          </a:solidFill>
+          <a:ln>
+            <a:noFill/>
+          </a:ln>
+        </p:spPr>
+        <p:style>
+          <a:lnRef idx="2">
+            <a:schemeClr val="accent1">
+              <a:shade val="50000"/>
+            </a:schemeClr>
+          </a:lnRef>
+          <a:fillRef idx="1">
+            <a:schemeClr val="accent1"/>
+          </a:fillRef>
+          <a:effectRef idx="0">
+            <a:schemeClr val="accent1"/>
+          </a:effectRef>
+          <a:fontRef idx="minor">
+            <a:schemeClr val="lt1"/>
+          </a:fontRef>
+        </p:style>
+        <p:txBody>
+          <a:bodyPr rtlCol="0" anchor="ctr"/>
+          <a:lstStyle/>
+          <a:p>
+            <a:pPr algn="ctr"/>
+            <a:endParaRPr lang="ko-KR" altLang="en-US"/>
+          </a:p>
+        </p:txBody>
+      </p:sp>
+      <p:sp>
+        <p:nvSpPr>
+          <p:cNvPr id="30" name="타원 29"/>
+          <p:cNvSpPr/>
+          <p:nvPr/>
+        </p:nvSpPr>
+        <p:spPr>
+          <a:xfrm>
+            <a:off x="6188456" y="4109352"/>
+            <a:ext cx="1303593" cy="1303593"/>
+          </a:xfrm>
+          <a:prstGeom prst="ellipse">
+            <a:avLst/>
+          </a:prstGeom>
+          <a:solidFill>
+            <a:schemeClr val="bg1"/>
+          </a:solidFill>
+          <a:ln>
+            <a:noFill/>
+          </a:ln>
+        </p:spPr>
+        <p:style>
+          <a:lnRef idx="2">
+            <a:schemeClr val="accent1">
+              <a:shade val="50000"/>
+            </a:schemeClr>
+          </a:lnRef>
+          <a:fillRef idx="1">
+            <a:schemeClr val="accent1"/>
+          </a:fillRef>
+          <a:effectRef idx="0">
+            <a:schemeClr val="accent1"/>
+          </a:effectRef>
+          <a:fontRef idx="minor">
+            <a:schemeClr val="lt1"/>
+          </a:fontRef>
+        </p:style>
+        <p:txBody>
+          <a:bodyPr rtlCol="0" anchor="ctr"/>
+          <a:lstStyle/>
+          <a:p>
+            <a:pPr algn="ctr"/>
+            <a:endParaRPr lang="ko-KR" altLang="en-US"/>
+          </a:p>
+        </p:txBody>
+      </p:sp>
+      <p:sp>
+        <p:nvSpPr>
+          <p:cNvPr id="27" name="원형 화살표 26"/>
+          <p:cNvSpPr/>
+          <p:nvPr/>
+        </p:nvSpPr>
+        <p:spPr>
+          <a:xfrm>
+            <a:off x="6295454" y="4216350"/>
+            <a:ext cx="1089596" cy="1089596"/>
+          </a:xfrm>
+          <a:prstGeom prst="circularArrow">
+            <a:avLst>
+              <a:gd name="adj1" fmla="val 17804"/>
+              <a:gd name="adj2" fmla="val 1640854"/>
+              <a:gd name="adj3" fmla="val 18293065"/>
+              <a:gd name="adj4" fmla="val 2973501"/>
+              <a:gd name="adj5" fmla="val 18368"/>
+            </a:avLst>
+          </a:prstGeom>
+          <a:solidFill>
+            <a:schemeClr val="accent3">
+              <a:lumMod val="75000"/>
+            </a:schemeClr>
+          </a:solidFill>
+          <a:ln>
+            <a:noFill/>
+          </a:ln>
+        </p:spPr>
+        <p:style>
+          <a:lnRef idx="2">
+            <a:schemeClr val="accent3">
+              <a:shade val="50000"/>
+            </a:schemeClr>
+          </a:lnRef>
+          <a:fillRef idx="1">
+            <a:schemeClr val="accent3"/>
+          </a:fillRef>
+          <a:effectRef idx="0">
+            <a:schemeClr val="accent3"/>
+          </a:effectRef>
+          <a:fontRef idx="minor">
+            <a:schemeClr val="lt1"/>
+          </a:fontRef>
+        </p:style>
+        <p:txBody>
+          <a:bodyPr rtlCol="0" anchor="ctr"/>
+          <a:lstStyle/>
+          <a:p>
+            <a:pPr algn="ctr"/>
+            <a:endParaRPr lang="ko-KR" altLang="en-US">
+              <a:solidFill>
+                <a:schemeClr val="tx1"/>
+              </a:solidFill>
+            </a:endParaRPr>
+          </a:p>
+        </p:txBody>
+      </p:sp>
+      <p:grpSp>
+        <p:nvGrpSpPr>
+          <p:cNvPr id="9" name="그룹 41"/>
+          <p:cNvGrpSpPr/>
+          <p:nvPr/>
+        </p:nvGrpSpPr>
+        <p:grpSpPr>
+          <a:xfrm>
+            <a:off x="2195736" y="4077072"/>
+            <a:ext cx="1512168" cy="1512168"/>
+            <a:chOff x="2195736" y="4077072"/>
+            <a:chExt cx="1512168" cy="1512168"/>
+          </a:xfrm>
+        </p:grpSpPr>
+        <p:sp>
+          <p:nvSpPr>
+            <p:cNvPr id="35" name="타원 34"/>
+            <p:cNvSpPr/>
+            <p:nvPr/>
+          </p:nvSpPr>
+          <p:spPr>
+            <a:xfrm rot="10800000">
+              <a:off x="2195736" y="4077072"/>
+              <a:ext cx="1512168" cy="1512168"/>
+            </a:xfrm>
+            <a:prstGeom prst="ellipse">
+              <a:avLst/>
+            </a:prstGeom>
+            <a:solidFill>
+              <a:schemeClr val="accent3">
+                <a:lumMod val="50000"/>
+              </a:schemeClr>
+            </a:solidFill>
+            <a:ln>
+              <a:noFill/>
+            </a:ln>
+          </p:spPr>
+          <p:style>
+            <a:lnRef idx="2">
+              <a:schemeClr val="accent1">
+                <a:shade val="50000"/>
+              </a:schemeClr>
+            </a:lnRef>
+            <a:fillRef idx="1">
+              <a:schemeClr val="accent1"/>
+            </a:fillRef>
+            <a:effectRef idx="0">
+              <a:schemeClr val="accent1"/>
+            </a:effectRef>
+            <a:fontRef idx="minor">
+              <a:schemeClr val="lt1"/>
+            </a:fontRef>
+          </p:style>
+          <p:txBody>
+            <a:bodyPr rtlCol="0" anchor="ctr"/>
+            <a:lstStyle/>
+            <a:p>
+              <a:pPr algn="ctr"/>
+              <a:endParaRPr lang="ko-KR" altLang="en-US"/>
+            </a:p>
+          </p:txBody>
+        </p:sp>
+        <p:sp>
+          <p:nvSpPr>
+            <p:cNvPr id="36" name="타원 35"/>
+            <p:cNvSpPr/>
+            <p:nvPr/>
+          </p:nvSpPr>
+          <p:spPr>
+            <a:xfrm rot="10800000">
+              <a:off x="2300023" y="4181360"/>
+              <a:ext cx="1303593" cy="1303593"/>
+            </a:xfrm>
+            <a:prstGeom prst="ellipse">
+              <a:avLst/>
+            </a:prstGeom>
+            <a:solidFill>
+              <a:schemeClr val="accent3">
+                <a:lumMod val="50000"/>
+              </a:schemeClr>
+            </a:solidFill>
+            <a:ln>
+              <a:noFill/>
+            </a:ln>
+          </p:spPr>
+          <p:style>
+            <a:lnRef idx="2">
+              <a:schemeClr val="accent1">
+                <a:shade val="50000"/>
+              </a:schemeClr>
+            </a:lnRef>
+            <a:fillRef idx="1">
+              <a:schemeClr val="accent1"/>
+            </a:fillRef>
+            <a:effectRef idx="0">
+              <a:schemeClr val="accent1"/>
+            </a:effectRef>
+            <a:fontRef idx="minor">
+              <a:schemeClr val="lt1"/>
+            </a:fontRef>
+          </p:style>
+          <p:txBody>
+            <a:bodyPr rtlCol="0" anchor="ctr"/>
+            <a:lstStyle/>
+            <a:p>
+              <a:pPr algn="ctr"/>
+              <a:endParaRPr lang="ko-KR" altLang="en-US"/>
+            </a:p>
+          </p:txBody>
+        </p:sp>
+        <p:grpSp>
+          <p:nvGrpSpPr>
+            <p:cNvPr id="10" name="그룹 40"/>
+            <p:cNvGrpSpPr/>
+            <p:nvPr/>
+          </p:nvGrpSpPr>
+          <p:grpSpPr>
+            <a:xfrm>
+              <a:off x="2555776" y="4407793"/>
+              <a:ext cx="792086" cy="698026"/>
+              <a:chOff x="2494540" y="4293096"/>
+              <a:chExt cx="914558" cy="805955"/>
+            </a:xfrm>
+          </p:grpSpPr>
+          <p:sp>
+            <p:nvSpPr>
+              <p:cNvPr id="33" name="이등변 삼각형 32"/>
+              <p:cNvSpPr/>
+              <p:nvPr/>
+            </p:nvSpPr>
+            <p:spPr>
+              <a:xfrm>
+                <a:off x="2494540" y="4293096"/>
+                <a:ext cx="914558" cy="479549"/>
+              </a:xfrm>
+              <a:prstGeom prst="triangle">
+                <a:avLst>
+                  <a:gd name="adj" fmla="val 49479"/>
+                </a:avLst>
+              </a:prstGeom>
+              <a:solidFill>
+                <a:schemeClr val="accent3">
+                  <a:lumMod val="75000"/>
+                </a:schemeClr>
+              </a:solidFill>
+              <a:ln>
+                <a:noFill/>
+              </a:ln>
+            </p:spPr>
+            <p:style>
+              <a:lnRef idx="2">
+                <a:schemeClr val="accent1">
+                  <a:shade val="50000"/>
+                </a:schemeClr>
+              </a:lnRef>
+              <a:fillRef idx="1">
+                <a:schemeClr val="accent1"/>
+              </a:fillRef>
+              <a:effectRef idx="0">
+                <a:schemeClr val="accent1"/>
+              </a:effectRef>
+              <a:fontRef idx="minor">
+                <a:schemeClr val="lt1"/>
+              </a:fontRef>
+            </p:style>
+            <p:txBody>
+              <a:bodyPr rtlCol="0" anchor="ctr"/>
+              <a:lstStyle/>
+              <a:p>
+                <a:pPr algn="ctr"/>
+                <a:endParaRPr lang="ko-KR" altLang="en-US"/>
+              </a:p>
+            </p:txBody>
+          </p:sp>
+          <p:sp>
+            <p:nvSpPr>
+              <p:cNvPr id="38" name="직사각형 37"/>
+              <p:cNvSpPr/>
+              <p:nvPr/>
+            </p:nvSpPr>
+            <p:spPr>
+              <a:xfrm>
+                <a:off x="2496955" y="4766484"/>
+                <a:ext cx="332567" cy="332567"/>
+              </a:xfrm>
+              <a:prstGeom prst="rect">
+                <a:avLst/>
+              </a:prstGeom>
+              <a:solidFill>
+                <a:schemeClr val="accent3">
+                  <a:lumMod val="75000"/>
+                </a:schemeClr>
+              </a:solidFill>
+              <a:ln>
+                <a:noFill/>
+              </a:ln>
+            </p:spPr>
+            <p:style>
+              <a:lnRef idx="2">
+                <a:schemeClr val="accent1">
+                  <a:shade val="50000"/>
+                </a:schemeClr>
+              </a:lnRef>
+              <a:fillRef idx="1">
+                <a:schemeClr val="accent1"/>
+              </a:fillRef>
+              <a:effectRef idx="0">
+                <a:schemeClr val="accent1"/>
+              </a:effectRef>
+              <a:fontRef idx="minor">
+                <a:schemeClr val="lt1"/>
+              </a:fontRef>
+            </p:style>
+            <p:txBody>
+              <a:bodyPr rtlCol="0" anchor="ctr"/>
+              <a:lstStyle/>
+              <a:p>
+                <a:pPr algn="ctr"/>
+                <a:endParaRPr lang="ko-KR" altLang="en-US"/>
+              </a:p>
+            </p:txBody>
+          </p:sp>
+          <p:sp>
+            <p:nvSpPr>
+              <p:cNvPr id="39" name="직사각형 38"/>
+              <p:cNvSpPr/>
+              <p:nvPr/>
+            </p:nvSpPr>
+            <p:spPr>
+              <a:xfrm>
+                <a:off x="3071401" y="4766485"/>
+                <a:ext cx="332567" cy="332566"/>
+              </a:xfrm>
+              <a:prstGeom prst="rect">
+                <a:avLst/>
+              </a:prstGeom>
+              <a:solidFill>
+                <a:schemeClr val="accent3">
+                  <a:lumMod val="75000"/>
+                </a:schemeClr>
+              </a:solidFill>
+              <a:ln>
+                <a:noFill/>
+              </a:ln>
+            </p:spPr>
+            <p:style>
+              <a:lnRef idx="2">
+                <a:schemeClr val="accent1">
+                  <a:shade val="50000"/>
+                </a:schemeClr>
+              </a:lnRef>
+              <a:fillRef idx="1">
+                <a:schemeClr val="accent1"/>
+              </a:fillRef>
+              <a:effectRef idx="0">
+                <a:schemeClr val="accent1"/>
+              </a:effectRef>
+              <a:fontRef idx="minor">
+                <a:schemeClr val="lt1"/>
+              </a:fontRef>
+            </p:style>
+            <p:txBody>
+              <a:bodyPr rtlCol="0" anchor="ctr"/>
+              <a:lstStyle/>
+              <a:p>
+                <a:pPr algn="ctr"/>
+                <a:endParaRPr lang="ko-KR" altLang="en-US"/>
+              </a:p>
+            </p:txBody>
+          </p:sp>
+        </p:grpSp>
+      </p:grpSp>
+      <p:grpSp>
+        <p:nvGrpSpPr>
+          <p:cNvPr id="11" name="그룹 50"/>
+          <p:cNvGrpSpPr/>
+          <p:nvPr/>
+        </p:nvGrpSpPr>
+        <p:grpSpPr>
+          <a:xfrm>
+            <a:off x="4211960" y="4005064"/>
+            <a:ext cx="1512168" cy="1512168"/>
+            <a:chOff x="4211960" y="4005064"/>
+            <a:chExt cx="1512168" cy="1512168"/>
+          </a:xfrm>
+        </p:grpSpPr>
+        <p:sp>
+          <p:nvSpPr>
+            <p:cNvPr id="44" name="타원 43"/>
+            <p:cNvSpPr/>
+            <p:nvPr/>
+          </p:nvSpPr>
+          <p:spPr>
+            <a:xfrm>
+              <a:off x="4211960" y="4005064"/>
+              <a:ext cx="1512168" cy="1512168"/>
+            </a:xfrm>
+            <a:prstGeom prst="ellipse">
+              <a:avLst/>
+            </a:prstGeom>
+            <a:solidFill>
+              <a:schemeClr val="accent3">
+                <a:lumMod val="50000"/>
+              </a:schemeClr>
+            </a:solidFill>
+            <a:ln>
+              <a:noFill/>
+            </a:ln>
+          </p:spPr>
+          <p:style>
+            <a:lnRef idx="2">
+              <a:schemeClr val="accent1">
+                <a:shade val="50000"/>
+              </a:schemeClr>
+            </a:lnRef>
+            <a:fillRef idx="1">
+              <a:schemeClr val="accent1"/>
+            </a:fillRef>
+            <a:effectRef idx="0">
+              <a:schemeClr val="accent1"/>
+            </a:effectRef>
+            <a:fontRef idx="minor">
+              <a:schemeClr val="lt1"/>
+            </a:fontRef>
+          </p:style>
+          <p:txBody>
+            <a:bodyPr rtlCol="0" anchor="ctr"/>
+            <a:lstStyle/>
+            <a:p>
+              <a:pPr algn="ctr"/>
+              <a:endParaRPr lang="ko-KR" altLang="en-US"/>
+            </a:p>
+          </p:txBody>
+        </p:sp>
+        <p:sp>
+          <p:nvSpPr>
+            <p:cNvPr id="45" name="타원 44"/>
+            <p:cNvSpPr/>
+            <p:nvPr/>
+          </p:nvSpPr>
+          <p:spPr>
+            <a:xfrm>
+              <a:off x="4316248" y="4109352"/>
+              <a:ext cx="1303593" cy="1303593"/>
+            </a:xfrm>
+            <a:prstGeom prst="ellipse">
+              <a:avLst/>
+            </a:prstGeom>
+            <a:solidFill>
+              <a:schemeClr val="accent3">
+                <a:lumMod val="50000"/>
+              </a:schemeClr>
+            </a:solidFill>
+            <a:ln>
+              <a:noFill/>
+            </a:ln>
+          </p:spPr>
+          <p:style>
+            <a:lnRef idx="2">
+              <a:schemeClr val="accent1">
+                <a:shade val="50000"/>
+              </a:schemeClr>
+            </a:lnRef>
+            <a:fillRef idx="1">
+              <a:schemeClr val="accent1"/>
+            </a:fillRef>
+            <a:effectRef idx="0">
+              <a:schemeClr val="accent1"/>
+            </a:effectRef>
+            <a:fontRef idx="minor">
+              <a:schemeClr val="lt1"/>
+            </a:fontRef>
+          </p:style>
+          <p:txBody>
+            <a:bodyPr rtlCol="0" anchor="ctr"/>
+            <a:lstStyle/>
+            <a:p>
+              <a:pPr algn="ctr"/>
+              <a:endParaRPr lang="ko-KR" altLang="en-US"/>
+            </a:p>
+          </p:txBody>
+        </p:sp>
+        <p:grpSp>
+          <p:nvGrpSpPr>
+            <p:cNvPr id="12" name="그룹 48"/>
+            <p:cNvGrpSpPr/>
+            <p:nvPr/>
+          </p:nvGrpSpPr>
+          <p:grpSpPr>
+            <a:xfrm>
+              <a:off x="4556368" y="4349472"/>
+              <a:ext cx="823352" cy="823352"/>
+              <a:chOff x="4572000" y="4437112"/>
+              <a:chExt cx="720080" cy="720080"/>
+            </a:xfrm>
+            <a:solidFill>
+              <a:schemeClr val="accent3">
+                <a:lumMod val="75000"/>
+              </a:schemeClr>
+            </a:solidFill>
+          </p:grpSpPr>
+          <p:sp>
+            <p:nvSpPr>
+              <p:cNvPr id="47" name="모서리가 둥근 직사각형 46"/>
+              <p:cNvSpPr/>
+              <p:nvPr/>
+            </p:nvSpPr>
+            <p:spPr>
+              <a:xfrm>
+                <a:off x="4572000" y="4689140"/>
+                <a:ext cx="720080" cy="216024"/>
+              </a:xfrm>
+              <a:prstGeom prst="roundRect">
+                <a:avLst/>
+              </a:prstGeom>
+              <a:grpFill/>
+              <a:ln>
+                <a:noFill/>
+              </a:ln>
+            </p:spPr>
+            <p:style>
+              <a:lnRef idx="2">
+                <a:schemeClr val="accent3">
+                  <a:shade val="50000"/>
+                </a:schemeClr>
+              </a:lnRef>
+              <a:fillRef idx="1">
+                <a:schemeClr val="accent3"/>
+              </a:fillRef>
+              <a:effectRef idx="0">
+                <a:schemeClr val="accent3"/>
+              </a:effectRef>
+              <a:fontRef idx="minor">
+                <a:schemeClr val="lt1"/>
+              </a:fontRef>
+            </p:style>
+            <p:txBody>
+              <a:bodyPr rtlCol="0" anchor="ctr"/>
+              <a:lstStyle/>
+              <a:p>
+                <a:pPr algn="ctr"/>
+                <a:endParaRPr lang="ko-KR" altLang="en-US"/>
+              </a:p>
+            </p:txBody>
+          </p:sp>
+          <p:sp>
+            <p:nvSpPr>
+              <p:cNvPr id="48" name="모서리가 둥근 직사각형 47"/>
+              <p:cNvSpPr/>
+              <p:nvPr/>
+            </p:nvSpPr>
+            <p:spPr>
+              <a:xfrm rot="5400000">
+                <a:off x="4572000" y="4689140"/>
+                <a:ext cx="720080" cy="216024"/>
+              </a:xfrm>
+              <a:prstGeom prst="roundRect">
+                <a:avLst/>
+              </a:prstGeom>
+              <a:grpFill/>
+              <a:ln>
+                <a:noFill/>
+              </a:ln>
+            </p:spPr>
+            <p:style>
+              <a:lnRef idx="2">
+                <a:schemeClr val="accent3">
+                  <a:shade val="50000"/>
+                </a:schemeClr>
+              </a:lnRef>
+              <a:fillRef idx="1">
+                <a:schemeClr val="accent3"/>
+              </a:fillRef>
+              <a:effectRef idx="0">
+                <a:schemeClr val="accent3"/>
+              </a:effectRef>
+              <a:fontRef idx="minor">
+                <a:schemeClr val="lt1"/>
+              </a:fontRef>
+            </p:style>
+            <p:txBody>
+              <a:bodyPr rtlCol="0" anchor="ctr"/>
+              <a:lstStyle/>
+              <a:p>
+                <a:pPr algn="ctr"/>
+                <a:endParaRPr lang="ko-KR" altLang="en-US"/>
+              </a:p>
+            </p:txBody>
+          </p:sp>
+        </p:grpSp>
+      </p:grpSp>
+    </p:spTree>
+  </p:cSld>
+  <p:clrMapOvr>
+    <a:masterClrMapping/>
+  </p:clrMapOvr>
+  <p:timing>
+    <p:tnLst>
+      <p:par>
+        <p:cTn id="1" dur="indefinite" restart="never" nodeType="tmRoot"/>
+      </p:par>
+    </p:tnLst>
+  </p:timing>
+</p:sld>
+</file>
+
 <file path=ppt/theme/theme1.xml><?xml version="1.0" encoding="utf-8"?>
 <a:theme xmlns:a="http://schemas.openxmlformats.org/drawingml/2006/main" name="Office 테마">
   <a:themeElements>

</xml_diff>